<commit_message>
Updates bwa method signatures given in lecture to match latest version.
</commit_message>
<xml_diff>
--- a/lectures/EBI_NGS_rsvc_slides.pptx
+++ b/lectures/EBI_NGS_rsvc_slides.pptx
@@ -160,6 +160,22 @@
       </a:defRPr>
     </a:lvl9pPr>
   </p:defaultTextStyle>
+  <p:extLst>
+    <p:ext uri="{EFAFB233-063F-42B5-8137-9DF3F51BA10A}">
+      <p15:sldGuideLst xmlns:p15="http://schemas.microsoft.com/office/powerpoint/2012/main">
+        <p15:guide id="1" orient="horz" pos="2160">
+          <p15:clr>
+            <a:srgbClr val="A4A3A4"/>
+          </p15:clr>
+        </p15:guide>
+        <p15:guide id="2" pos="2880">
+          <p15:clr>
+            <a:srgbClr val="A4A3A4"/>
+          </p15:clr>
+        </p15:guide>
+      </p15:sldGuideLst>
+    </p:ext>
+  </p:extLst>
 </p:presentation>
 </file>
 
@@ -245,7 +261,7 @@
           <a:p>
             <a:fld id="{683B11D8-A7E4-EF43-B6E1-02D8D0F96BD3}" type="datetimeFigureOut">
               <a:rPr lang="en-US" smtClean="0"/>
-              <a:t>06/04/16</a:t>
+              <a:t>9/26/16</a:t>
             </a:fld>
             <a:endParaRPr lang="en-US"/>
           </a:p>
@@ -411,7 +427,7 @@
             <a:fld id="{62009DDE-F922-854C-BEFF-CE1DF0F32BA2}" type="datetimeFigureOut">
               <a:rPr lang="en-US" smtClean="0"/>
               <a:pPr/>
-              <a:t>06/04/16</a:t>
+              <a:t>9/26/16</a:t>
             </a:fld>
             <a:endParaRPr lang="en-US"/>
           </a:p>
@@ -850,6 +866,11 @@
         </p:txBody>
       </p:sp>
     </p:spTree>
+    <p:extLst>
+      <p:ext uri="{BB962C8B-B14F-4D97-AF65-F5344CB8AC3E}">
+        <p14:creationId xmlns:p14="http://schemas.microsoft.com/office/powerpoint/2010/main" val="961760465"/>
+      </p:ext>
+    </p:extLst>
   </p:cSld>
   <p:clrMapOvr>
     <a:masterClrMapping/>
@@ -957,6 +978,11 @@
         </p:txBody>
       </p:sp>
     </p:spTree>
+    <p:extLst>
+      <p:ext uri="{BB962C8B-B14F-4D97-AF65-F5344CB8AC3E}">
+        <p14:creationId xmlns:p14="http://schemas.microsoft.com/office/powerpoint/2010/main" val="198724286"/>
+      </p:ext>
+    </p:extLst>
   </p:cSld>
   <p:clrMapOvr>
     <a:masterClrMapping/>
@@ -1081,6 +1107,11 @@
         </p:txBody>
       </p:sp>
     </p:spTree>
+    <p:extLst>
+      <p:ext uri="{BB962C8B-B14F-4D97-AF65-F5344CB8AC3E}">
+        <p14:creationId xmlns:p14="http://schemas.microsoft.com/office/powerpoint/2010/main" val="622003717"/>
+      </p:ext>
+    </p:extLst>
   </p:cSld>
   <p:clrMapOvr>
     <a:masterClrMapping/>
@@ -1205,6 +1236,11 @@
         </p:txBody>
       </p:sp>
     </p:spTree>
+    <p:extLst>
+      <p:ext uri="{BB962C8B-B14F-4D97-AF65-F5344CB8AC3E}">
+        <p14:creationId xmlns:p14="http://schemas.microsoft.com/office/powerpoint/2010/main" val="66078023"/>
+      </p:ext>
+    </p:extLst>
   </p:cSld>
   <p:clrMapOvr>
     <a:masterClrMapping/>
@@ -1329,6 +1365,11 @@
         </p:txBody>
       </p:sp>
     </p:spTree>
+    <p:extLst>
+      <p:ext uri="{BB962C8B-B14F-4D97-AF65-F5344CB8AC3E}">
+        <p14:creationId xmlns:p14="http://schemas.microsoft.com/office/powerpoint/2010/main" val="2126638595"/>
+      </p:ext>
+    </p:extLst>
   </p:cSld>
   <p:clrMapOvr>
     <a:masterClrMapping/>
@@ -1415,6 +1456,11 @@
         </p:txBody>
       </p:sp>
     </p:spTree>
+    <p:extLst>
+      <p:ext uri="{BB962C8B-B14F-4D97-AF65-F5344CB8AC3E}">
+        <p14:creationId xmlns:p14="http://schemas.microsoft.com/office/powerpoint/2010/main" val="1844529144"/>
+      </p:ext>
+    </p:extLst>
   </p:cSld>
   <p:clrMapOvr>
     <a:masterClrMapping/>
@@ -1539,6 +1585,11 @@
         </p:txBody>
       </p:sp>
     </p:spTree>
+    <p:extLst>
+      <p:ext uri="{BB962C8B-B14F-4D97-AF65-F5344CB8AC3E}">
+        <p14:creationId xmlns:p14="http://schemas.microsoft.com/office/powerpoint/2010/main" val="2074878763"/>
+      </p:ext>
+    </p:extLst>
   </p:cSld>
   <p:clrMapOvr>
     <a:masterClrMapping/>
@@ -1663,6 +1714,11 @@
         </p:txBody>
       </p:sp>
     </p:spTree>
+    <p:extLst>
+      <p:ext uri="{BB962C8B-B14F-4D97-AF65-F5344CB8AC3E}">
+        <p14:creationId xmlns:p14="http://schemas.microsoft.com/office/powerpoint/2010/main" val="1937533053"/>
+      </p:ext>
+    </p:extLst>
   </p:cSld>
   <p:clrMapOvr>
     <a:masterClrMapping/>
@@ -1745,6 +1801,11 @@
         </p:txBody>
       </p:sp>
     </p:spTree>
+    <p:extLst>
+      <p:ext uri="{BB962C8B-B14F-4D97-AF65-F5344CB8AC3E}">
+        <p14:creationId xmlns:p14="http://schemas.microsoft.com/office/powerpoint/2010/main" val="1823482310"/>
+      </p:ext>
+    </p:extLst>
   </p:cSld>
   <p:clrMapOvr>
     <a:masterClrMapping/>
@@ -1831,6 +1892,11 @@
         </p:txBody>
       </p:sp>
     </p:spTree>
+    <p:extLst>
+      <p:ext uri="{BB962C8B-B14F-4D97-AF65-F5344CB8AC3E}">
+        <p14:creationId xmlns:p14="http://schemas.microsoft.com/office/powerpoint/2010/main" val="528057833"/>
+      </p:ext>
+    </p:extLst>
   </p:cSld>
   <p:clrMapOvr>
     <a:masterClrMapping/>
@@ -1933,6 +1999,11 @@
         </p:txBody>
       </p:sp>
     </p:spTree>
+    <p:extLst>
+      <p:ext uri="{BB962C8B-B14F-4D97-AF65-F5344CB8AC3E}">
+        <p14:creationId xmlns:p14="http://schemas.microsoft.com/office/powerpoint/2010/main" val="1665569827"/>
+      </p:ext>
+    </p:extLst>
   </p:cSld>
   <p:clrMapOvr>
     <a:masterClrMapping/>
@@ -2035,6 +2106,11 @@
         </p:txBody>
       </p:sp>
     </p:spTree>
+    <p:extLst>
+      <p:ext uri="{BB962C8B-B14F-4D97-AF65-F5344CB8AC3E}">
+        <p14:creationId xmlns:p14="http://schemas.microsoft.com/office/powerpoint/2010/main" val="782743744"/>
+      </p:ext>
+    </p:extLst>
   </p:cSld>
   <p:clrMapOvr>
     <a:masterClrMapping/>
@@ -2137,6 +2213,11 @@
         </p:txBody>
       </p:sp>
     </p:spTree>
+    <p:extLst>
+      <p:ext uri="{BB962C8B-B14F-4D97-AF65-F5344CB8AC3E}">
+        <p14:creationId xmlns:p14="http://schemas.microsoft.com/office/powerpoint/2010/main" val="89283886"/>
+      </p:ext>
+    </p:extLst>
   </p:cSld>
   <p:clrMapOvr>
     <a:masterClrMapping/>
@@ -2279,6 +2360,11 @@
         </p:txBody>
       </p:sp>
     </p:spTree>
+    <p:extLst>
+      <p:ext uri="{BB962C8B-B14F-4D97-AF65-F5344CB8AC3E}">
+        <p14:creationId xmlns:p14="http://schemas.microsoft.com/office/powerpoint/2010/main" val="1650686396"/>
+      </p:ext>
+    </p:extLst>
   </p:cSld>
   <p:clrMapOvr>
     <a:masterClrMapping/>
@@ -2369,6 +2455,11 @@
         </p:txBody>
       </p:sp>
     </p:spTree>
+    <p:extLst>
+      <p:ext uri="{BB962C8B-B14F-4D97-AF65-F5344CB8AC3E}">
+        <p14:creationId xmlns:p14="http://schemas.microsoft.com/office/powerpoint/2010/main" val="1892505626"/>
+      </p:ext>
+    </p:extLst>
   </p:cSld>
   <p:clrMapOvr>
     <a:masterClrMapping/>
@@ -2585,11 +2676,11 @@
   <p:clrMapOvr>
     <a:masterClrMapping/>
   </p:clrMapOvr>
-  <p:transition xmlns:p14="http://schemas.microsoft.com/office/powerpoint/2010/main" spd="med"/>
+  <p:transition spd="med"/>
   <p:timing>
     <p:tnLst>
       <p:par>
-        <p:cTn xmlns:p14="http://schemas.microsoft.com/office/powerpoint/2010/main" id="1" dur="indefinite" restart="never" nodeType="tmRoot"/>
+        <p:cTn id="1" dur="indefinite" restart="never" nodeType="tmRoot"/>
       </p:par>
     </p:tnLst>
   </p:timing>
@@ -2693,7 +2784,7 @@
   <p:clrMapOvr>
     <a:masterClrMapping/>
   </p:clrMapOvr>
-  <p:transition xmlns:p14="http://schemas.microsoft.com/office/powerpoint/2010/main" spd="med"/>
+  <p:transition spd="med"/>
 </p:sldLayout>
 </file>
 
@@ -2804,7 +2895,7 @@
   <p:clrMapOvr>
     <a:masterClrMapping/>
   </p:clrMapOvr>
-  <p:transition xmlns:p14="http://schemas.microsoft.com/office/powerpoint/2010/main" spd="med"/>
+  <p:transition spd="med"/>
 </p:sldLayout>
 </file>
 
@@ -2998,7 +3089,7 @@
             <a:fld id="{839ABAFC-AAE2-164B-92D4-13A10F0236EE}" type="datetimeFigureOut">
               <a:rPr lang="en-US" smtClean="0"/>
               <a:pPr/>
-              <a:t>06/04/16</a:t>
+              <a:t>9/26/16</a:t>
             </a:fld>
             <a:endParaRPr lang="en-US"/>
           </a:p>
@@ -3168,7 +3259,7 @@
   <p:clrMapOvr>
     <a:masterClrMapping/>
   </p:clrMapOvr>
-  <p:transition xmlns:p14="http://schemas.microsoft.com/office/powerpoint/2010/main" spd="med"/>
+  <p:transition spd="med"/>
 </p:sldLayout>
 </file>
 
@@ -3291,7 +3382,7 @@
   <p:clrMapOvr>
     <a:masterClrMapping/>
   </p:clrMapOvr>
-  <p:transition xmlns:p14="http://schemas.microsoft.com/office/powerpoint/2010/main" spd="med"/>
+  <p:transition spd="med"/>
 </p:sldLayout>
 </file>
 
@@ -3510,7 +3601,7 @@
   <p:clrMapOvr>
     <a:masterClrMapping/>
   </p:clrMapOvr>
-  <p:transition xmlns:p14="http://schemas.microsoft.com/office/powerpoint/2010/main" spd="med"/>
+  <p:transition spd="med"/>
 </p:sldLayout>
 </file>
 
@@ -3868,7 +3959,7 @@
   <p:clrMapOvr>
     <a:masterClrMapping/>
   </p:clrMapOvr>
-  <p:transition xmlns:p14="http://schemas.microsoft.com/office/powerpoint/2010/main" spd="med"/>
+  <p:transition spd="med"/>
 </p:sldLayout>
 </file>
 
@@ -3917,7 +4008,7 @@
   <p:clrMapOvr>
     <a:masterClrMapping/>
   </p:clrMapOvr>
-  <p:transition xmlns:p14="http://schemas.microsoft.com/office/powerpoint/2010/main" spd="med"/>
+  <p:transition spd="med"/>
 </p:sldLayout>
 </file>
 
@@ -3943,7 +4034,7 @@
   <p:clrMapOvr>
     <a:masterClrMapping/>
   </p:clrMapOvr>
-  <p:transition xmlns:p14="http://schemas.microsoft.com/office/powerpoint/2010/main" spd="med"/>
+  <p:transition spd="med"/>
 </p:sldLayout>
 </file>
 
@@ -4151,7 +4242,7 @@
   <p:clrMapOvr>
     <a:masterClrMapping/>
   </p:clrMapOvr>
-  <p:transition xmlns:p14="http://schemas.microsoft.com/office/powerpoint/2010/main" spd="med"/>
+  <p:transition spd="med"/>
 </p:sldLayout>
 </file>
 
@@ -4339,7 +4430,7 @@
   <p:clrMapOvr>
     <a:masterClrMapping/>
   </p:clrMapOvr>
-  <p:transition xmlns:p14="http://schemas.microsoft.com/office/powerpoint/2010/main" spd="med"/>
+  <p:transition spd="med"/>
 </p:sldLayout>
 </file>
 
@@ -4740,11 +4831,11 @@
     <p:sldLayoutId id="2147483671" r:id="rId11"/>
     <p:sldLayoutId id="2147483672" r:id="rId12"/>
   </p:sldLayoutIdLst>
-  <p:transition xmlns:p14="http://schemas.microsoft.com/office/powerpoint/2010/main" spd="med"/>
+  <p:transition spd="med"/>
   <p:timing>
     <p:tnLst>
       <p:par>
-        <p:cTn xmlns:p14="http://schemas.microsoft.com/office/powerpoint/2010/main" id="1" dur="indefinite" restart="never" nodeType="tmRoot"/>
+        <p:cTn id="1" dur="indefinite" restart="never" nodeType="tmRoot"/>
       </p:par>
     </p:tnLst>
   </p:timing>
@@ -5303,7 +5394,7 @@
   <p:timing>
     <p:tnLst>
       <p:par>
-        <p:cTn xmlns:p14="http://schemas.microsoft.com/office/powerpoint/2010/main" id="1" dur="indefinite" restart="never" nodeType="tmRoot"/>
+        <p:cTn id="1" dur="indefinite" restart="never" nodeType="tmRoot"/>
       </p:par>
     </p:tnLst>
   </p:timing>
@@ -5368,11 +5459,7 @@
           <a:p>
             <a:r>
               <a:rPr lang="en-US" dirty="0" smtClean="0"/>
-              <a:t>Smith-Waterman </a:t>
-            </a:r>
-            <a:r>
-              <a:rPr lang="en-US" dirty="0" smtClean="0"/>
-              <a:t>Alignment Algorithm</a:t>
+              <a:t>Smith-Waterman Alignment Algorithm</a:t>
             </a:r>
             <a:endParaRPr lang="en-US" dirty="0"/>
           </a:p>
@@ -7114,21 +7201,13 @@
           <a:p>
             <a:r>
               <a:rPr lang="en-US" dirty="0" smtClean="0"/>
-              <a:t>Match score (s): </a:t>
-            </a:r>
-            <a:r>
-              <a:rPr lang="en-US" dirty="0" smtClean="0"/>
-              <a:t>+1</a:t>
-            </a:r>
-          </a:p>
-          <a:p>
-            <a:r>
-              <a:rPr lang="en-US" dirty="0" smtClean="0"/>
-              <a:t>Mismatch score (s): </a:t>
-            </a:r>
-            <a:r>
-              <a:rPr lang="en-US" dirty="0" smtClean="0"/>
-              <a:t>0</a:t>
+              <a:t>Match score (s): +1</a:t>
+            </a:r>
+          </a:p>
+          <a:p>
+            <a:r>
+              <a:rPr lang="en-US" dirty="0" smtClean="0"/>
+              <a:t>Mismatch score (s): 0</a:t>
             </a:r>
           </a:p>
           <a:p>
@@ -7138,11 +7217,7 @@
             </a:r>
             <a:r>
               <a:rPr lang="en-US" dirty="0" smtClean="0"/>
-              <a:t> penalty (-d): </a:t>
-            </a:r>
-            <a:r>
-              <a:rPr lang="en-US" dirty="0" smtClean="0"/>
-              <a:t>-1</a:t>
+              <a:t> penalty (-d): -1</a:t>
             </a:r>
           </a:p>
         </p:txBody>
@@ -7157,11 +7232,11 @@
   <p:clrMapOvr>
     <a:masterClrMapping/>
   </p:clrMapOvr>
-  <p:transition xmlns:p14="http://schemas.microsoft.com/office/powerpoint/2010/main" spd="med"/>
+  <p:transition spd="med"/>
   <p:timing>
     <p:tnLst>
       <p:par>
-        <p:cTn xmlns:p14="http://schemas.microsoft.com/office/powerpoint/2010/main" id="1" dur="indefinite" restart="never" nodeType="tmRoot"/>
+        <p:cTn id="1" dur="indefinite" restart="never" nodeType="tmRoot"/>
       </p:par>
     </p:tnLst>
   </p:timing>
@@ -7343,11 +7418,11 @@
   <p:clrMapOvr>
     <a:masterClrMapping/>
   </p:clrMapOvr>
-  <p:transition xmlns:p14="http://schemas.microsoft.com/office/powerpoint/2010/main" spd="med"/>
+  <p:transition spd="med"/>
   <p:timing>
     <p:tnLst>
       <p:par>
-        <p:cTn xmlns:p14="http://schemas.microsoft.com/office/powerpoint/2010/main" id="1" dur="indefinite" restart="never" nodeType="tmRoot"/>
+        <p:cTn id="1" dur="indefinite" restart="never" nodeType="tmRoot"/>
       </p:par>
     </p:tnLst>
   </p:timing>
@@ -7550,11 +7625,11 @@
   <p:clrMapOvr>
     <a:masterClrMapping/>
   </p:clrMapOvr>
-  <p:transition xmlns:p14="http://schemas.microsoft.com/office/powerpoint/2010/main" spd="med"/>
+  <p:transition spd="med"/>
   <p:timing>
     <p:tnLst>
       <p:par>
-        <p:cTn xmlns:p14="http://schemas.microsoft.com/office/powerpoint/2010/main" id="1" dur="indefinite" restart="never" nodeType="tmRoot"/>
+        <p:cTn id="1" dur="indefinite" restart="never" nodeType="tmRoot"/>
       </p:par>
     </p:tnLst>
   </p:timing>
@@ -7630,11 +7705,11 @@
   <p:clrMapOvr>
     <a:masterClrMapping/>
   </p:clrMapOvr>
-  <p:transition xmlns:p14="http://schemas.microsoft.com/office/powerpoint/2010/main" spd="med"/>
+  <p:transition spd="med"/>
   <p:timing>
     <p:tnLst>
       <p:par>
-        <p:cTn xmlns:p14="http://schemas.microsoft.com/office/powerpoint/2010/main" id="1" dur="indefinite" restart="never" nodeType="tmRoot"/>
+        <p:cTn id="1" dur="indefinite" restart="never" nodeType="tmRoot"/>
       </p:par>
     </p:tnLst>
   </p:timing>
@@ -7709,11 +7784,11 @@
   <p:clrMapOvr>
     <a:masterClrMapping/>
   </p:clrMapOvr>
-  <p:transition xmlns:p14="http://schemas.microsoft.com/office/powerpoint/2010/main" spd="med"/>
+  <p:transition spd="med"/>
   <p:timing>
     <p:tnLst>
       <p:par>
-        <p:cTn xmlns:p14="http://schemas.microsoft.com/office/powerpoint/2010/main" id="1" dur="indefinite" restart="never" nodeType="tmRoot"/>
+        <p:cTn id="1" dur="indefinite" restart="never" nodeType="tmRoot"/>
       </p:par>
     </p:tnLst>
   </p:timing>
@@ -7789,35 +7864,21 @@
                 <a:latin typeface="Courier"/>
                 <a:cs typeface="Courier"/>
               </a:rPr>
-              <a:t> index [-a </a:t>
-            </a:r>
-            <a:r>
-              <a:rPr lang="en-US" dirty="0" err="1" smtClean="0">
-                <a:latin typeface="Courier"/>
-                <a:cs typeface="Courier"/>
-              </a:rPr>
-              <a:t>bwtsw|div|is</a:t>
+              <a:t> index </a:t>
             </a:r>
             <a:r>
               <a:rPr lang="en-US" dirty="0" smtClean="0">
                 <a:latin typeface="Courier"/>
                 <a:cs typeface="Courier"/>
               </a:rPr>
-              <a:t>] [-</a:t>
-            </a:r>
-            <a:r>
-              <a:rPr lang="en-US" dirty="0" err="1" smtClean="0">
-                <a:latin typeface="Courier"/>
-                <a:cs typeface="Courier"/>
-              </a:rPr>
-              <a:t>c</a:t>
+              <a:t>[options] </a:t>
             </a:r>
             <a:r>
               <a:rPr lang="en-US" dirty="0" smtClean="0">
                 <a:latin typeface="Courier"/>
                 <a:cs typeface="Courier"/>
               </a:rPr>
-              <a:t>] &lt;</a:t>
+              <a:t>&lt;</a:t>
             </a:r>
             <a:r>
               <a:rPr lang="en-US" dirty="0" err="1" smtClean="0">
@@ -8010,35 +8071,21 @@
                 <a:latin typeface="Courier"/>
                 <a:cs typeface="Courier"/>
               </a:rPr>
-              <a:t> [-</a:t>
-            </a:r>
-            <a:r>
-              <a:rPr lang="en-US" dirty="0" err="1" smtClean="0">
+              <a:t> </a:t>
+            </a:r>
+            <a:r>
+              <a:rPr lang="en-US" smtClean="0">
                 <a:latin typeface="Courier"/>
                 <a:cs typeface="Courier"/>
               </a:rPr>
-              <a:t>n</a:t>
+              <a:t>[options] </a:t>
             </a:r>
             <a:r>
               <a:rPr lang="en-US" dirty="0" smtClean="0">
                 <a:latin typeface="Courier"/>
                 <a:cs typeface="Courier"/>
               </a:rPr>
-              <a:t> </a:t>
-            </a:r>
-            <a:r>
-              <a:rPr lang="en-US" dirty="0" err="1" smtClean="0">
-                <a:latin typeface="Courier"/>
-                <a:cs typeface="Courier"/>
-              </a:rPr>
-              <a:t>max_occ</a:t>
-            </a:r>
-            <a:r>
-              <a:rPr lang="en-US" dirty="0" smtClean="0">
-                <a:latin typeface="Courier"/>
-                <a:cs typeface="Courier"/>
-              </a:rPr>
-              <a:t>] &lt;prefix&gt; &lt;</a:t>
+              <a:t>&lt;prefix&gt; &lt;</a:t>
             </a:r>
             <a:r>
               <a:rPr lang="en-US" dirty="0" err="1" smtClean="0">
@@ -8153,11 +8200,11 @@
   <p:clrMapOvr>
     <a:masterClrMapping/>
   </p:clrMapOvr>
-  <p:transition xmlns:p14="http://schemas.microsoft.com/office/powerpoint/2010/main" spd="med"/>
+  <p:transition spd="med"/>
   <p:timing>
     <p:tnLst>
       <p:par>
-        <p:cTn xmlns:p14="http://schemas.microsoft.com/office/powerpoint/2010/main" id="1" dur="indefinite" restart="never" nodeType="tmRoot"/>
+        <p:cTn id="1" dur="indefinite" restart="never" nodeType="tmRoot"/>
       </p:par>
     </p:tnLst>
   </p:timing>
@@ -8396,11 +8443,11 @@
   <p:clrMapOvr>
     <a:masterClrMapping/>
   </p:clrMapOvr>
-  <p:transition xmlns:p14="http://schemas.microsoft.com/office/powerpoint/2010/main" spd="med"/>
+  <p:transition spd="med"/>
   <p:timing>
     <p:tnLst>
       <p:par>
-        <p:cTn xmlns:p14="http://schemas.microsoft.com/office/powerpoint/2010/main" id="1" dur="indefinite" restart="never" nodeType="tmRoot"/>
+        <p:cTn id="1" dur="indefinite" restart="never" nodeType="tmRoot"/>
       </p:par>
     </p:tnLst>
   </p:timing>
@@ -8561,35 +8608,7 @@
             </a:r>
             <a:r>
               <a:rPr lang="en-US" b="1" dirty="0" smtClean="0"/>
-              <a:t>’ </a:t>
-            </a:r>
-            <a:r>
-              <a:rPr lang="en-US" b="1" dirty="0" smtClean="0"/>
-              <a:t>on your </a:t>
-            </a:r>
-            <a:r>
-              <a:rPr lang="en-US" b="1" dirty="0" smtClean="0"/>
-              <a:t>file </a:t>
-            </a:r>
-            <a:r>
-              <a:rPr lang="en-US" b="1" dirty="0" smtClean="0"/>
-              <a:t>is </a:t>
-            </a:r>
-            <a:r>
-              <a:rPr lang="en-US" b="1" dirty="0" smtClean="0"/>
-              <a:t>one </a:t>
-            </a:r>
-            <a:r>
-              <a:rPr lang="en-US" b="1" dirty="0" smtClean="0"/>
-              <a:t>way </a:t>
-            </a:r>
-            <a:r>
-              <a:rPr lang="en-US" b="1" dirty="0" smtClean="0"/>
-              <a:t>to </a:t>
-            </a:r>
-            <a:r>
-              <a:rPr lang="en-US" b="1" dirty="0" smtClean="0"/>
-              <a:t>check</a:t>
+              <a:t>’ on your file is one way to check</a:t>
             </a:r>
           </a:p>
           <a:p>
@@ -8606,7 +8625,6 @@
               <a:rPr lang="en-US" dirty="0" smtClean="0"/>
               <a:t> index` should also give an error if input is truncated</a:t>
             </a:r>
-            <a:endParaRPr lang="en-US" dirty="0" smtClean="0"/>
           </a:p>
         </p:txBody>
       </p:sp>
@@ -8615,11 +8633,11 @@
   <p:clrMapOvr>
     <a:masterClrMapping/>
   </p:clrMapOvr>
-  <p:transition xmlns:p14="http://schemas.microsoft.com/office/powerpoint/2010/main" spd="med"/>
+  <p:transition spd="med"/>
   <p:timing>
     <p:tnLst>
       <p:par>
-        <p:cTn xmlns:p14="http://schemas.microsoft.com/office/powerpoint/2010/main" id="1" dur="indefinite" restart="never" nodeType="tmRoot"/>
+        <p:cTn id="1" dur="indefinite" restart="never" nodeType="tmRoot"/>
       </p:par>
     </p:tnLst>
   </p:timing>
@@ -8758,11 +8776,11 @@
   <p:clrMapOvr>
     <a:masterClrMapping/>
   </p:clrMapOvr>
-  <p:transition xmlns:p14="http://schemas.microsoft.com/office/powerpoint/2010/main" spd="med"/>
+  <p:transition spd="med"/>
   <p:timing>
     <p:tnLst>
       <p:par>
-        <p:cTn xmlns:p14="http://schemas.microsoft.com/office/powerpoint/2010/main" id="1" dur="indefinite" restart="never" nodeType="tmRoot"/>
+        <p:cTn id="1" dur="indefinite" restart="never" nodeType="tmRoot"/>
       </p:par>
     </p:tnLst>
   </p:timing>
@@ -8838,11 +8856,11 @@
   <p:clrMapOvr>
     <a:masterClrMapping/>
   </p:clrMapOvr>
-  <p:transition xmlns:p14="http://schemas.microsoft.com/office/powerpoint/2010/main" spd="med"/>
+  <p:transition spd="med"/>
   <p:timing>
     <p:tnLst>
       <p:par>
-        <p:cTn xmlns:p14="http://schemas.microsoft.com/office/powerpoint/2010/main" id="1" dur="indefinite" restart="never" nodeType="tmRoot"/>
+        <p:cTn id="1" dur="indefinite" restart="never" nodeType="tmRoot"/>
       </p:par>
     </p:tnLst>
   </p:timing>
@@ -9173,13 +9191,13 @@
   <p:clrMapOvr>
     <a:masterClrMapping/>
   </p:clrMapOvr>
-  <p:transition xmlns:p14="http://schemas.microsoft.com/office/powerpoint/2010/main" spd="med">
+  <p:transition spd="med">
     <p:wipe dir="r"/>
   </p:transition>
   <p:timing>
     <p:tnLst>
       <p:par>
-        <p:cTn xmlns:p14="http://schemas.microsoft.com/office/powerpoint/2010/main" id="1" dur="indefinite" restart="never" nodeType="tmRoot"/>
+        <p:cTn id="1" dur="indefinite" restart="never" nodeType="tmRoot"/>
       </p:par>
     </p:tnLst>
   </p:timing>
@@ -9250,11 +9268,11 @@
   <p:clrMapOvr>
     <a:masterClrMapping/>
   </p:clrMapOvr>
-  <p:transition xmlns:p14="http://schemas.microsoft.com/office/powerpoint/2010/main" spd="med"/>
+  <p:transition spd="med"/>
   <p:timing>
     <p:tnLst>
       <p:par>
-        <p:cTn xmlns:p14="http://schemas.microsoft.com/office/powerpoint/2010/main" id="1" dur="indefinite" restart="never" nodeType="tmRoot"/>
+        <p:cTn id="1" dur="indefinite" restart="never" nodeType="tmRoot"/>
       </p:par>
     </p:tnLst>
   </p:timing>
@@ -9330,11 +9348,11 @@
   <p:clrMapOvr>
     <a:masterClrMapping/>
   </p:clrMapOvr>
-  <p:transition xmlns:p14="http://schemas.microsoft.com/office/powerpoint/2010/main" spd="med"/>
+  <p:transition spd="med"/>
   <p:timing>
     <p:tnLst>
       <p:par>
-        <p:cTn xmlns:p14="http://schemas.microsoft.com/office/powerpoint/2010/main" id="1" dur="indefinite" restart="never" nodeType="tmRoot"/>
+        <p:cTn id="1" dur="indefinite" restart="never" nodeType="tmRoot"/>
       </p:par>
     </p:tnLst>
   </p:timing>
@@ -9414,11 +9432,11 @@
   <p:clrMapOvr>
     <a:masterClrMapping/>
   </p:clrMapOvr>
-  <p:transition xmlns:p14="http://schemas.microsoft.com/office/powerpoint/2010/main" spd="med"/>
+  <p:transition spd="med"/>
   <p:timing>
     <p:tnLst>
       <p:par>
-        <p:cTn xmlns:p14="http://schemas.microsoft.com/office/powerpoint/2010/main" id="1" dur="indefinite" restart="never" nodeType="tmRoot"/>
+        <p:cTn id="1" dur="indefinite" restart="never" nodeType="tmRoot"/>
       </p:par>
     </p:tnLst>
   </p:timing>
@@ -9498,11 +9516,11 @@
   <p:clrMapOvr>
     <a:masterClrMapping/>
   </p:clrMapOvr>
-  <p:transition xmlns:p14="http://schemas.microsoft.com/office/powerpoint/2010/main" spd="med"/>
+  <p:transition spd="med"/>
   <p:timing>
     <p:tnLst>
       <p:par>
-        <p:cTn xmlns:p14="http://schemas.microsoft.com/office/powerpoint/2010/main" id="1" dur="indefinite" restart="never" nodeType="tmRoot"/>
+        <p:cTn id="1" dur="indefinite" restart="never" nodeType="tmRoot"/>
       </p:par>
     </p:tnLst>
   </p:timing>
@@ -9578,11 +9596,11 @@
   <p:clrMapOvr>
     <a:masterClrMapping/>
   </p:clrMapOvr>
-  <p:transition xmlns:p14="http://schemas.microsoft.com/office/powerpoint/2010/main" spd="med"/>
+  <p:transition spd="med"/>
   <p:timing>
     <p:tnLst>
       <p:par>
-        <p:cTn xmlns:p14="http://schemas.microsoft.com/office/powerpoint/2010/main" id="1" dur="indefinite" restart="never" nodeType="tmRoot"/>
+        <p:cTn id="1" dur="indefinite" restart="never" nodeType="tmRoot"/>
       </p:par>
     </p:tnLst>
   </p:timing>
@@ -9733,11 +9751,11 @@
   <p:clrMapOvr>
     <a:masterClrMapping/>
   </p:clrMapOvr>
-  <p:transition xmlns:p14="http://schemas.microsoft.com/office/powerpoint/2010/main" spd="med"/>
+  <p:transition spd="med"/>
   <p:timing>
     <p:tnLst>
       <p:par>
-        <p:cTn xmlns:p14="http://schemas.microsoft.com/office/powerpoint/2010/main" id="1" dur="indefinite" restart="never" nodeType="tmRoot"/>
+        <p:cTn id="1" dur="indefinite" restart="never" nodeType="tmRoot"/>
       </p:par>
     </p:tnLst>
   </p:timing>
@@ -10068,13 +10086,13 @@
   <p:clrMapOvr>
     <a:masterClrMapping/>
   </p:clrMapOvr>
-  <p:transition xmlns:p14="http://schemas.microsoft.com/office/powerpoint/2010/main" spd="med">
+  <p:transition spd="med">
     <p:wipe dir="r"/>
   </p:transition>
   <p:timing>
     <p:tnLst>
       <p:par>
-        <p:cTn xmlns:p14="http://schemas.microsoft.com/office/powerpoint/2010/main" id="1" dur="indefinite" restart="never" nodeType="tmRoot"/>
+        <p:cTn id="1" dur="indefinite" restart="never" nodeType="tmRoot"/>
       </p:par>
     </p:tnLst>
   </p:timing>
@@ -10405,13 +10423,13 @@
   <p:clrMapOvr>
     <a:masterClrMapping/>
   </p:clrMapOvr>
-  <p:transition xmlns:p14="http://schemas.microsoft.com/office/powerpoint/2010/main" spd="med">
+  <p:transition spd="med">
     <p:wipe dir="r"/>
   </p:transition>
   <p:timing>
     <p:tnLst>
       <p:par>
-        <p:cTn xmlns:p14="http://schemas.microsoft.com/office/powerpoint/2010/main" id="1" dur="indefinite" restart="never" nodeType="tmRoot"/>
+        <p:cTn id="1" dur="indefinite" restart="never" nodeType="tmRoot"/>
       </p:par>
     </p:tnLst>
   </p:timing>
@@ -13230,14 +13248,14 @@
           </a:ln>
           <a:extLst>
             <a:ext uri="{909E8E84-426E-40dd-AFC4-6F175D3DCCD1}">
-              <a14:hiddenFill xmlns:a14="http://schemas.microsoft.com/office/drawing/2010/main">
+              <a14:hiddenFill xmlns:a14="http://schemas.microsoft.com/office/drawing/2010/main" xmlns="">
                 <a:solidFill>
                   <a:srgbClr val="FFFFFF"/>
                 </a:solidFill>
               </a14:hiddenFill>
             </a:ext>
             <a:ext uri="{91240B29-F687-4f45-9708-019B960494DF}">
-              <a14:hiddenLine xmlns:a14="http://schemas.microsoft.com/office/drawing/2010/main" w="9525">
+              <a14:hiddenLine xmlns:a14="http://schemas.microsoft.com/office/drawing/2010/main" xmlns="" w="9525">
                 <a:solidFill>
                   <a:srgbClr val="000000"/>
                 </a:solidFill>
@@ -13284,14 +13302,14 @@
           </a:ln>
           <a:extLst>
             <a:ext uri="{909E8E84-426E-40dd-AFC4-6F175D3DCCD1}">
-              <a14:hiddenFill xmlns:a14="http://schemas.microsoft.com/office/drawing/2010/main">
+              <a14:hiddenFill xmlns:a14="http://schemas.microsoft.com/office/drawing/2010/main" xmlns="">
                 <a:solidFill>
                   <a:srgbClr val="FFFFFF"/>
                 </a:solidFill>
               </a14:hiddenFill>
             </a:ext>
             <a:ext uri="{91240B29-F687-4f45-9708-019B960494DF}">
-              <a14:hiddenLine xmlns:a14="http://schemas.microsoft.com/office/drawing/2010/main" w="9525">
+              <a14:hiddenLine xmlns:a14="http://schemas.microsoft.com/office/drawing/2010/main" xmlns="" w="9525">
                 <a:solidFill>
                   <a:srgbClr val="000000"/>
                 </a:solidFill>
@@ -13338,14 +13356,14 @@
           </a:ln>
           <a:extLst>
             <a:ext uri="{909E8E84-426E-40dd-AFC4-6F175D3DCCD1}">
-              <a14:hiddenFill xmlns:a14="http://schemas.microsoft.com/office/drawing/2010/main">
+              <a14:hiddenFill xmlns:a14="http://schemas.microsoft.com/office/drawing/2010/main" xmlns="">
                 <a:solidFill>
                   <a:srgbClr val="FFFFFF"/>
                 </a:solidFill>
               </a14:hiddenFill>
             </a:ext>
             <a:ext uri="{91240B29-F687-4f45-9708-019B960494DF}">
-              <a14:hiddenLine xmlns:a14="http://schemas.microsoft.com/office/drawing/2010/main" w="9525">
+              <a14:hiddenLine xmlns:a14="http://schemas.microsoft.com/office/drawing/2010/main" xmlns="" w="9525">
                 <a:solidFill>
                   <a:srgbClr val="000000"/>
                 </a:solidFill>
@@ -13392,14 +13410,14 @@
           </a:ln>
           <a:extLst>
             <a:ext uri="{909E8E84-426E-40dd-AFC4-6F175D3DCCD1}">
-              <a14:hiddenFill xmlns:a14="http://schemas.microsoft.com/office/drawing/2010/main">
+              <a14:hiddenFill xmlns:a14="http://schemas.microsoft.com/office/drawing/2010/main" xmlns="">
                 <a:solidFill>
                   <a:srgbClr val="FFFFFF"/>
                 </a:solidFill>
               </a14:hiddenFill>
             </a:ext>
             <a:ext uri="{91240B29-F687-4f45-9708-019B960494DF}">
-              <a14:hiddenLine xmlns:a14="http://schemas.microsoft.com/office/drawing/2010/main" w="9525">
+              <a14:hiddenLine xmlns:a14="http://schemas.microsoft.com/office/drawing/2010/main" xmlns="" w="9525">
                 <a:solidFill>
                   <a:srgbClr val="000000"/>
                 </a:solidFill>
@@ -13452,14 +13470,14 @@
           </a:scene3d>
           <a:extLst>
             <a:ext uri="{909E8E84-426E-40dd-AFC4-6F175D3DCCD1}">
-              <a14:hiddenFill xmlns:a14="http://schemas.microsoft.com/office/drawing/2010/main">
+              <a14:hiddenFill xmlns:a14="http://schemas.microsoft.com/office/drawing/2010/main" xmlns="">
                 <a:solidFill>
                   <a:srgbClr val="FFFFFF"/>
                 </a:solidFill>
               </a14:hiddenFill>
             </a:ext>
             <a:ext uri="{91240B29-F687-4f45-9708-019B960494DF}">
-              <a14:hiddenLine xmlns:a14="http://schemas.microsoft.com/office/drawing/2010/main" w="9525">
+              <a14:hiddenLine xmlns:a14="http://schemas.microsoft.com/office/drawing/2010/main" xmlns="" w="9525">
                 <a:solidFill>
                   <a:srgbClr val="000000"/>
                 </a:solidFill>
@@ -13476,11 +13494,11 @@
   <p:clrMapOvr>
     <a:masterClrMapping/>
   </p:clrMapOvr>
-  <p:transition xmlns:p14="http://schemas.microsoft.com/office/powerpoint/2010/main" spd="med"/>
+  <p:transition spd="med"/>
   <p:timing>
     <p:tnLst>
       <p:par>
-        <p:cTn xmlns:p14="http://schemas.microsoft.com/office/powerpoint/2010/main" id="1" dur="indefinite" restart="never" nodeType="tmRoot"/>
+        <p:cTn id="1" dur="indefinite" restart="never" nodeType="tmRoot"/>
       </p:par>
     </p:tnLst>
   </p:timing>
@@ -16366,14 +16384,14 @@
           </a:ln>
           <a:extLst>
             <a:ext uri="{909E8E84-426E-40dd-AFC4-6F175D3DCCD1}">
-              <a14:hiddenFill xmlns:a14="http://schemas.microsoft.com/office/drawing/2010/main">
+              <a14:hiddenFill xmlns:a14="http://schemas.microsoft.com/office/drawing/2010/main" xmlns="">
                 <a:solidFill>
                   <a:srgbClr val="FFFFFF"/>
                 </a:solidFill>
               </a14:hiddenFill>
             </a:ext>
             <a:ext uri="{91240B29-F687-4f45-9708-019B960494DF}">
-              <a14:hiddenLine xmlns:a14="http://schemas.microsoft.com/office/drawing/2010/main" w="9525">
+              <a14:hiddenLine xmlns:a14="http://schemas.microsoft.com/office/drawing/2010/main" xmlns="" w="9525">
                 <a:solidFill>
                   <a:srgbClr val="000000"/>
                 </a:solidFill>
@@ -16420,14 +16438,14 @@
           </a:ln>
           <a:extLst>
             <a:ext uri="{909E8E84-426E-40dd-AFC4-6F175D3DCCD1}">
-              <a14:hiddenFill xmlns:a14="http://schemas.microsoft.com/office/drawing/2010/main">
+              <a14:hiddenFill xmlns:a14="http://schemas.microsoft.com/office/drawing/2010/main" xmlns="">
                 <a:solidFill>
                   <a:srgbClr val="FFFFFF"/>
                 </a:solidFill>
               </a14:hiddenFill>
             </a:ext>
             <a:ext uri="{91240B29-F687-4f45-9708-019B960494DF}">
-              <a14:hiddenLine xmlns:a14="http://schemas.microsoft.com/office/drawing/2010/main" w="9525">
+              <a14:hiddenLine xmlns:a14="http://schemas.microsoft.com/office/drawing/2010/main" xmlns="" w="9525">
                 <a:solidFill>
                   <a:srgbClr val="000000"/>
                 </a:solidFill>
@@ -16474,14 +16492,14 @@
           </a:ln>
           <a:extLst>
             <a:ext uri="{909E8E84-426E-40dd-AFC4-6F175D3DCCD1}">
-              <a14:hiddenFill xmlns:a14="http://schemas.microsoft.com/office/drawing/2010/main">
+              <a14:hiddenFill xmlns:a14="http://schemas.microsoft.com/office/drawing/2010/main" xmlns="">
                 <a:solidFill>
                   <a:srgbClr val="FFFFFF"/>
                 </a:solidFill>
               </a14:hiddenFill>
             </a:ext>
             <a:ext uri="{91240B29-F687-4f45-9708-019B960494DF}">
-              <a14:hiddenLine xmlns:a14="http://schemas.microsoft.com/office/drawing/2010/main" w="9525">
+              <a14:hiddenLine xmlns:a14="http://schemas.microsoft.com/office/drawing/2010/main" xmlns="" w="9525">
                 <a:solidFill>
                   <a:srgbClr val="000000"/>
                 </a:solidFill>
@@ -16528,14 +16546,14 @@
           </a:ln>
           <a:extLst>
             <a:ext uri="{909E8E84-426E-40dd-AFC4-6F175D3DCCD1}">
-              <a14:hiddenFill xmlns:a14="http://schemas.microsoft.com/office/drawing/2010/main">
+              <a14:hiddenFill xmlns:a14="http://schemas.microsoft.com/office/drawing/2010/main" xmlns="">
                 <a:solidFill>
                   <a:srgbClr val="FFFFFF"/>
                 </a:solidFill>
               </a14:hiddenFill>
             </a:ext>
             <a:ext uri="{91240B29-F687-4f45-9708-019B960494DF}">
-              <a14:hiddenLine xmlns:a14="http://schemas.microsoft.com/office/drawing/2010/main" w="9525">
+              <a14:hiddenLine xmlns:a14="http://schemas.microsoft.com/office/drawing/2010/main" xmlns="" w="9525">
                 <a:solidFill>
                   <a:srgbClr val="000000"/>
                 </a:solidFill>
@@ -16588,14 +16606,14 @@
           </a:scene3d>
           <a:extLst>
             <a:ext uri="{909E8E84-426E-40dd-AFC4-6F175D3DCCD1}">
-              <a14:hiddenFill xmlns:a14="http://schemas.microsoft.com/office/drawing/2010/main">
+              <a14:hiddenFill xmlns:a14="http://schemas.microsoft.com/office/drawing/2010/main" xmlns="">
                 <a:solidFill>
                   <a:srgbClr val="FFFFFF"/>
                 </a:solidFill>
               </a14:hiddenFill>
             </a:ext>
             <a:ext uri="{91240B29-F687-4f45-9708-019B960494DF}">
-              <a14:hiddenLine xmlns:a14="http://schemas.microsoft.com/office/drawing/2010/main" w="9525">
+              <a14:hiddenLine xmlns:a14="http://schemas.microsoft.com/office/drawing/2010/main" xmlns="" w="9525">
                 <a:solidFill>
                   <a:srgbClr val="000000"/>
                 </a:solidFill>
@@ -16617,11 +16635,11 @@
   <p:clrMapOvr>
     <a:masterClrMapping/>
   </p:clrMapOvr>
-  <p:transition xmlns:p14="http://schemas.microsoft.com/office/powerpoint/2010/main" spd="med"/>
+  <p:transition spd="med"/>
   <p:timing>
     <p:tnLst>
       <p:par>
-        <p:cTn xmlns:p14="http://schemas.microsoft.com/office/powerpoint/2010/main" id="1" dur="indefinite" restart="never" nodeType="tmRoot"/>
+        <p:cTn id="1" dur="indefinite" restart="never" nodeType="tmRoot"/>
       </p:par>
     </p:tnLst>
   </p:timing>
@@ -16808,11 +16826,11 @@
   <p:clrMapOvr>
     <a:masterClrMapping/>
   </p:clrMapOvr>
-  <p:transition xmlns:p14="http://schemas.microsoft.com/office/powerpoint/2010/main" spd="med"/>
+  <p:transition spd="med"/>
   <p:timing>
     <p:tnLst>
       <p:par>
-        <p:cTn xmlns:p14="http://schemas.microsoft.com/office/powerpoint/2010/main" id="1" dur="indefinite" restart="never" nodeType="tmRoot"/>
+        <p:cTn id="1" dur="indefinite" restart="never" nodeType="tmRoot"/>
       </p:par>
     </p:tnLst>
   </p:timing>
@@ -16940,11 +16958,11 @@
   <p:clrMapOvr>
     <a:masterClrMapping/>
   </p:clrMapOvr>
-  <p:transition xmlns:p14="http://schemas.microsoft.com/office/powerpoint/2010/main" spd="med"/>
+  <p:transition spd="med"/>
   <p:timing>
     <p:tnLst>
       <p:par>
-        <p:cTn xmlns:p14="http://schemas.microsoft.com/office/powerpoint/2010/main" id="1" dur="indefinite" restart="never" nodeType="tmRoot"/>
+        <p:cTn id="1" dur="indefinite" restart="never" nodeType="tmRoot"/>
       </p:par>
     </p:tnLst>
   </p:timing>
@@ -17004,7 +17022,7 @@
         <p:spPr/>
         <p:txBody>
           <a:bodyPr>
-            <a:normAutofit fontScale="92500"/>
+            <a:normAutofit fontScale="92500" lnSpcReduction="10000"/>
           </a:bodyPr>
           <a:lstStyle/>
           <a:p>
@@ -17185,11 +17203,11 @@
   <p:clrMapOvr>
     <a:masterClrMapping/>
   </p:clrMapOvr>
-  <p:transition xmlns:p14="http://schemas.microsoft.com/office/powerpoint/2010/main" spd="med"/>
+  <p:transition spd="med"/>
   <p:timing>
     <p:tnLst>
       <p:par>
-        <p:cTn xmlns:p14="http://schemas.microsoft.com/office/powerpoint/2010/main" id="1" dur="indefinite" restart="never" nodeType="tmRoot"/>
+        <p:cTn id="1" dur="indefinite" restart="never" nodeType="tmRoot"/>
       </p:par>
     </p:tnLst>
   </p:timing>
@@ -17265,11 +17283,11 @@
   <p:clrMapOvr>
     <a:masterClrMapping/>
   </p:clrMapOvr>
-  <p:transition xmlns:p14="http://schemas.microsoft.com/office/powerpoint/2010/main" spd="med"/>
+  <p:transition spd="med"/>
   <p:timing>
     <p:tnLst>
       <p:par>
-        <p:cTn xmlns:p14="http://schemas.microsoft.com/office/powerpoint/2010/main" id="1" dur="indefinite" restart="never" nodeType="tmRoot"/>
+        <p:cTn id="1" dur="indefinite" restart="never" nodeType="tmRoot"/>
       </p:par>
     </p:tnLst>
   </p:timing>
@@ -17499,11 +17517,11 @@
   <p:clrMapOvr>
     <a:masterClrMapping/>
   </p:clrMapOvr>
-  <p:transition xmlns:p14="http://schemas.microsoft.com/office/powerpoint/2010/main" spd="med"/>
+  <p:transition spd="med"/>
   <p:timing>
     <p:tnLst>
       <p:par>
-        <p:cTn xmlns:p14="http://schemas.microsoft.com/office/powerpoint/2010/main" id="1" dur="indefinite" restart="never" nodeType="tmRoot"/>
+        <p:cTn id="1" dur="indefinite" restart="never" nodeType="tmRoot"/>
       </p:par>
     </p:tnLst>
   </p:timing>
@@ -17670,11 +17688,11 @@
   <p:clrMapOvr>
     <a:masterClrMapping/>
   </p:clrMapOvr>
-  <p:transition xmlns:p14="http://schemas.microsoft.com/office/powerpoint/2010/main" spd="med"/>
+  <p:transition spd="med"/>
   <p:timing>
     <p:tnLst>
       <p:par>
-        <p:cTn xmlns:p14="http://schemas.microsoft.com/office/powerpoint/2010/main" id="1" dur="indefinite" restart="never" nodeType="tmRoot"/>
+        <p:cTn id="1" dur="indefinite" restart="never" nodeType="tmRoot"/>
       </p:par>
     </p:tnLst>
   </p:timing>
@@ -17834,11 +17852,11 @@
   <p:clrMapOvr>
     <a:masterClrMapping/>
   </p:clrMapOvr>
-  <p:transition xmlns:p14="http://schemas.microsoft.com/office/powerpoint/2010/main" spd="med"/>
+  <p:transition spd="med"/>
   <p:timing>
     <p:tnLst>
       <p:par>
-        <p:cTn xmlns:p14="http://schemas.microsoft.com/office/powerpoint/2010/main" id="1" dur="indefinite" restart="never" nodeType="tmRoot"/>
+        <p:cTn id="1" dur="indefinite" restart="never" nodeType="tmRoot"/>
       </p:par>
     </p:tnLst>
   </p:timing>
@@ -20724,14 +20742,14 @@
           </a:ln>
           <a:extLst>
             <a:ext uri="{909E8E84-426E-40dd-AFC4-6F175D3DCCD1}">
-              <a14:hiddenFill xmlns:a14="http://schemas.microsoft.com/office/drawing/2010/main">
+              <a14:hiddenFill xmlns:a14="http://schemas.microsoft.com/office/drawing/2010/main" xmlns="">
                 <a:solidFill>
                   <a:srgbClr val="FFFFFF"/>
                 </a:solidFill>
               </a14:hiddenFill>
             </a:ext>
             <a:ext uri="{91240B29-F687-4f45-9708-019B960494DF}">
-              <a14:hiddenLine xmlns:a14="http://schemas.microsoft.com/office/drawing/2010/main" w="9525">
+              <a14:hiddenLine xmlns:a14="http://schemas.microsoft.com/office/drawing/2010/main" xmlns="" w="9525">
                 <a:solidFill>
                   <a:srgbClr val="000000"/>
                 </a:solidFill>
@@ -20778,14 +20796,14 @@
           </a:ln>
           <a:extLst>
             <a:ext uri="{909E8E84-426E-40dd-AFC4-6F175D3DCCD1}">
-              <a14:hiddenFill xmlns:a14="http://schemas.microsoft.com/office/drawing/2010/main">
+              <a14:hiddenFill xmlns:a14="http://schemas.microsoft.com/office/drawing/2010/main" xmlns="">
                 <a:solidFill>
                   <a:srgbClr val="FFFFFF"/>
                 </a:solidFill>
               </a14:hiddenFill>
             </a:ext>
             <a:ext uri="{91240B29-F687-4f45-9708-019B960494DF}">
-              <a14:hiddenLine xmlns:a14="http://schemas.microsoft.com/office/drawing/2010/main" w="9525">
+              <a14:hiddenLine xmlns:a14="http://schemas.microsoft.com/office/drawing/2010/main" xmlns="" w="9525">
                 <a:solidFill>
                   <a:srgbClr val="000000"/>
                 </a:solidFill>
@@ -20832,14 +20850,14 @@
           </a:ln>
           <a:extLst>
             <a:ext uri="{909E8E84-426E-40dd-AFC4-6F175D3DCCD1}">
-              <a14:hiddenFill xmlns:a14="http://schemas.microsoft.com/office/drawing/2010/main">
+              <a14:hiddenFill xmlns:a14="http://schemas.microsoft.com/office/drawing/2010/main" xmlns="">
                 <a:solidFill>
                   <a:srgbClr val="FFFFFF"/>
                 </a:solidFill>
               </a14:hiddenFill>
             </a:ext>
             <a:ext uri="{91240B29-F687-4f45-9708-019B960494DF}">
-              <a14:hiddenLine xmlns:a14="http://schemas.microsoft.com/office/drawing/2010/main" w="9525">
+              <a14:hiddenLine xmlns:a14="http://schemas.microsoft.com/office/drawing/2010/main" xmlns="" w="9525">
                 <a:solidFill>
                   <a:srgbClr val="000000"/>
                 </a:solidFill>
@@ -20886,14 +20904,14 @@
           </a:ln>
           <a:extLst>
             <a:ext uri="{909E8E84-426E-40dd-AFC4-6F175D3DCCD1}">
-              <a14:hiddenFill xmlns:a14="http://schemas.microsoft.com/office/drawing/2010/main">
+              <a14:hiddenFill xmlns:a14="http://schemas.microsoft.com/office/drawing/2010/main" xmlns="">
                 <a:solidFill>
                   <a:srgbClr val="FFFFFF"/>
                 </a:solidFill>
               </a14:hiddenFill>
             </a:ext>
             <a:ext uri="{91240B29-F687-4f45-9708-019B960494DF}">
-              <a14:hiddenLine xmlns:a14="http://schemas.microsoft.com/office/drawing/2010/main" w="9525">
+              <a14:hiddenLine xmlns:a14="http://schemas.microsoft.com/office/drawing/2010/main" xmlns="" w="9525">
                 <a:solidFill>
                   <a:srgbClr val="000000"/>
                 </a:solidFill>
@@ -20946,14 +20964,14 @@
           </a:scene3d>
           <a:extLst>
             <a:ext uri="{909E8E84-426E-40dd-AFC4-6F175D3DCCD1}">
-              <a14:hiddenFill xmlns:a14="http://schemas.microsoft.com/office/drawing/2010/main">
+              <a14:hiddenFill xmlns:a14="http://schemas.microsoft.com/office/drawing/2010/main" xmlns="">
                 <a:solidFill>
                   <a:srgbClr val="FFFFFF"/>
                 </a:solidFill>
               </a14:hiddenFill>
             </a:ext>
             <a:ext uri="{91240B29-F687-4f45-9708-019B960494DF}">
-              <a14:hiddenLine xmlns:a14="http://schemas.microsoft.com/office/drawing/2010/main" w="9525">
+              <a14:hiddenLine xmlns:a14="http://schemas.microsoft.com/office/drawing/2010/main" xmlns="" w="9525">
                 <a:solidFill>
                   <a:srgbClr val="000000"/>
                 </a:solidFill>
@@ -20975,11 +20993,11 @@
   <p:clrMapOvr>
     <a:masterClrMapping/>
   </p:clrMapOvr>
-  <p:transition xmlns:p14="http://schemas.microsoft.com/office/powerpoint/2010/main" spd="med"/>
+  <p:transition spd="med"/>
   <p:timing>
     <p:tnLst>
       <p:par>
-        <p:cTn xmlns:p14="http://schemas.microsoft.com/office/powerpoint/2010/main" id="1" dur="indefinite" restart="never" nodeType="tmRoot"/>
+        <p:cTn id="1" dur="indefinite" restart="never" nodeType="tmRoot"/>
       </p:par>
     </p:tnLst>
   </p:timing>
@@ -21123,11 +21141,11 @@
   <p:clrMapOvr>
     <a:masterClrMapping/>
   </p:clrMapOvr>
-  <p:transition xmlns:p14="http://schemas.microsoft.com/office/powerpoint/2010/main" spd="med"/>
+  <p:transition spd="med"/>
   <p:timing>
     <p:tnLst>
       <p:par>
-        <p:cTn xmlns:p14="http://schemas.microsoft.com/office/powerpoint/2010/main" id="1" dur="indefinite" restart="never" nodeType="tmRoot"/>
+        <p:cTn id="1" dur="indefinite" restart="never" nodeType="tmRoot"/>
       </p:par>
     </p:tnLst>
   </p:timing>
@@ -21317,11 +21335,11 @@
   <p:clrMapOvr>
     <a:masterClrMapping/>
   </p:clrMapOvr>
-  <p:transition xmlns:p14="http://schemas.microsoft.com/office/powerpoint/2010/main" spd="med"/>
+  <p:transition spd="med"/>
   <p:timing>
     <p:tnLst>
       <p:par>
-        <p:cTn xmlns:p14="http://schemas.microsoft.com/office/powerpoint/2010/main" id="1" dur="indefinite" restart="never" nodeType="tmRoot"/>
+        <p:cTn id="1" dur="indefinite" restart="never" nodeType="tmRoot"/>
       </p:par>
     </p:tnLst>
   </p:timing>
@@ -21549,11 +21567,11 @@
   <p:clrMapOvr>
     <a:masterClrMapping/>
   </p:clrMapOvr>
-  <p:transition xmlns:p14="http://schemas.microsoft.com/office/powerpoint/2010/main" spd="med"/>
+  <p:transition spd="med"/>
   <p:timing>
     <p:tnLst>
       <p:par>
-        <p:cTn xmlns:p14="http://schemas.microsoft.com/office/powerpoint/2010/main" id="1" dur="indefinite" restart="never" nodeType="tmRoot"/>
+        <p:cTn id="1" dur="indefinite" restart="never" nodeType="tmRoot"/>
       </p:par>
     </p:tnLst>
   </p:timing>
@@ -21831,11 +21849,11 @@
   <p:clrMapOvr>
     <a:masterClrMapping/>
   </p:clrMapOvr>
-  <p:transition xmlns:p14="http://schemas.microsoft.com/office/powerpoint/2010/main" spd="med"/>
+  <p:transition spd="med"/>
   <p:timing>
     <p:tnLst>
       <p:par>
-        <p:cTn xmlns:p14="http://schemas.microsoft.com/office/powerpoint/2010/main" id="1" dur="indefinite" restart="never" nodeType="tmRoot"/>
+        <p:cTn id="1" dur="indefinite" restart="never" nodeType="tmRoot"/>
       </p:par>
     </p:tnLst>
   </p:timing>
@@ -22016,11 +22034,11 @@
   <p:clrMapOvr>
     <a:masterClrMapping/>
   </p:clrMapOvr>
-  <p:transition xmlns:p14="http://schemas.microsoft.com/office/powerpoint/2010/main" spd="med"/>
+  <p:transition spd="med"/>
   <p:timing>
     <p:tnLst>
       <p:par>
-        <p:cTn xmlns:p14="http://schemas.microsoft.com/office/powerpoint/2010/main" id="1" dur="indefinite" restart="never" nodeType="tmRoot"/>
+        <p:cTn id="1" dur="indefinite" restart="never" nodeType="tmRoot"/>
       </p:par>
     </p:tnLst>
   </p:timing>
@@ -22358,13 +22376,13 @@
   <p:clrMapOvr>
     <a:masterClrMapping/>
   </p:clrMapOvr>
-  <p:transition xmlns:p14="http://schemas.microsoft.com/office/powerpoint/2010/main" spd="med">
+  <p:transition spd="med">
     <p:wipe dir="r"/>
   </p:transition>
   <p:timing>
     <p:tnLst>
       <p:par>
-        <p:cTn xmlns:p14="http://schemas.microsoft.com/office/powerpoint/2010/main" id="1" dur="indefinite" restart="never" nodeType="tmRoot"/>
+        <p:cTn id="1" dur="indefinite" restart="never" nodeType="tmRoot"/>
       </p:par>
     </p:tnLst>
   </p:timing>
@@ -22628,11 +22646,11 @@
   <p:clrMapOvr>
     <a:masterClrMapping/>
   </p:clrMapOvr>
-  <p:transition xmlns:p14="http://schemas.microsoft.com/office/powerpoint/2010/main" spd="med"/>
+  <p:transition spd="med"/>
   <p:timing>
     <p:tnLst>
       <p:par>
-        <p:cTn xmlns:p14="http://schemas.microsoft.com/office/powerpoint/2010/main" id="1" dur="indefinite" restart="never" nodeType="tmRoot"/>
+        <p:cTn id="1" dur="indefinite" restart="never" nodeType="tmRoot"/>
       </p:par>
     </p:tnLst>
   </p:timing>
@@ -22708,11 +22726,11 @@
   <p:clrMapOvr>
     <a:masterClrMapping/>
   </p:clrMapOvr>
-  <p:transition xmlns:p14="http://schemas.microsoft.com/office/powerpoint/2010/main" spd="med"/>
+  <p:transition spd="med"/>
   <p:timing>
     <p:tnLst>
       <p:par>
-        <p:cTn xmlns:p14="http://schemas.microsoft.com/office/powerpoint/2010/main" id="1" dur="indefinite" restart="never" nodeType="tmRoot"/>
+        <p:cTn id="1" dur="indefinite" restart="never" nodeType="tmRoot"/>
       </p:par>
     </p:tnLst>
   </p:timing>
@@ -22816,11 +22834,11 @@
   <p:clrMapOvr>
     <a:masterClrMapping/>
   </p:clrMapOvr>
-  <p:transition xmlns:p14="http://schemas.microsoft.com/office/powerpoint/2010/main" spd="med"/>
+  <p:transition spd="med"/>
   <p:timing>
     <p:tnLst>
       <p:par>
-        <p:cTn xmlns:p14="http://schemas.microsoft.com/office/powerpoint/2010/main" id="1" dur="indefinite" restart="never" nodeType="tmRoot"/>
+        <p:cTn id="1" dur="indefinite" restart="never" nodeType="tmRoot"/>
       </p:par>
     </p:tnLst>
   </p:timing>
@@ -23023,11 +23041,11 @@
   <p:clrMapOvr>
     <a:masterClrMapping/>
   </p:clrMapOvr>
-  <p:transition xmlns:p14="http://schemas.microsoft.com/office/powerpoint/2010/main" spd="med"/>
+  <p:transition spd="med"/>
   <p:timing>
     <p:tnLst>
       <p:par>
-        <p:cTn xmlns:p14="http://schemas.microsoft.com/office/powerpoint/2010/main" id="1" dur="indefinite" restart="never" nodeType="tmRoot"/>
+        <p:cTn id="1" dur="indefinite" restart="never" nodeType="tmRoot"/>
       </p:par>
     </p:tnLst>
   </p:timing>
@@ -23188,11 +23206,11 @@
   <p:clrMapOvr>
     <a:masterClrMapping/>
   </p:clrMapOvr>
-  <p:transition xmlns:p14="http://schemas.microsoft.com/office/powerpoint/2010/main" spd="med"/>
+  <p:transition spd="med"/>
   <p:timing>
     <p:tnLst>
       <p:par>
-        <p:cTn xmlns:p14="http://schemas.microsoft.com/office/powerpoint/2010/main" id="1" dur="indefinite" restart="never" nodeType="tmRoot"/>
+        <p:cTn id="1" dur="indefinite" restart="never" nodeType="tmRoot"/>
       </p:par>
     </p:tnLst>
   </p:timing>
@@ -23273,11 +23291,11 @@
   <p:clrMapOvr>
     <a:masterClrMapping/>
   </p:clrMapOvr>
-  <p:transition xmlns:p14="http://schemas.microsoft.com/office/powerpoint/2010/main" spd="med"/>
+  <p:transition spd="med"/>
   <p:timing>
     <p:tnLst>
       <p:par>
-        <p:cTn xmlns:p14="http://schemas.microsoft.com/office/powerpoint/2010/main" id="1" dur="indefinite" restart="never" nodeType="tmRoot"/>
+        <p:cTn id="1" dur="indefinite" restart="never" nodeType="tmRoot"/>
       </p:par>
     </p:tnLst>
   </p:timing>
@@ -23358,11 +23376,11 @@
   <p:clrMapOvr>
     <a:masterClrMapping/>
   </p:clrMapOvr>
-  <p:transition xmlns:p14="http://schemas.microsoft.com/office/powerpoint/2010/main" spd="med"/>
+  <p:transition spd="med"/>
   <p:timing>
     <p:tnLst>
       <p:par>
-        <p:cTn xmlns:p14="http://schemas.microsoft.com/office/powerpoint/2010/main" id="1" dur="indefinite" restart="never" nodeType="tmRoot"/>
+        <p:cTn id="1" dur="indefinite" restart="never" nodeType="tmRoot"/>
       </p:par>
     </p:tnLst>
   </p:timing>
@@ -23443,11 +23461,11 @@
   <p:clrMapOvr>
     <a:masterClrMapping/>
   </p:clrMapOvr>
-  <p:transition xmlns:p14="http://schemas.microsoft.com/office/powerpoint/2010/main" spd="med"/>
+  <p:transition spd="med"/>
   <p:timing>
     <p:tnLst>
       <p:par>
-        <p:cTn xmlns:p14="http://schemas.microsoft.com/office/powerpoint/2010/main" id="1" dur="indefinite" restart="never" nodeType="tmRoot"/>
+        <p:cTn id="1" dur="indefinite" restart="never" nodeType="tmRoot"/>
       </p:par>
     </p:tnLst>
   </p:timing>
@@ -23796,11 +23814,11 @@
   <p:clrMapOvr>
     <a:masterClrMapping/>
   </p:clrMapOvr>
-  <p:transition xmlns:p14="http://schemas.microsoft.com/office/powerpoint/2010/main" spd="med"/>
+  <p:transition spd="med"/>
   <p:timing>
     <p:tnLst>
       <p:par>
-        <p:cTn xmlns:p14="http://schemas.microsoft.com/office/powerpoint/2010/main" id="1" dur="indefinite" restart="never" nodeType="tmRoot">
+        <p:cTn id="1" dur="indefinite" restart="never" nodeType="tmRoot">
           <p:childTnLst>
             <p:seq concurrent="1" nextAc="seek">
               <p:cTn id="2" dur="indefinite" nodeType="mainSeq">
@@ -24084,11 +24102,11 @@
   <p:clrMapOvr>
     <a:masterClrMapping/>
   </p:clrMapOvr>
-  <p:transition xmlns:p14="http://schemas.microsoft.com/office/powerpoint/2010/main" spd="med"/>
+  <p:transition spd="med"/>
   <p:timing>
     <p:tnLst>
       <p:par>
-        <p:cTn xmlns:p14="http://schemas.microsoft.com/office/powerpoint/2010/main" id="1" dur="indefinite" restart="never" nodeType="tmRoot"/>
+        <p:cTn id="1" dur="indefinite" restart="never" nodeType="tmRoot"/>
       </p:par>
     </p:tnLst>
   </p:timing>
@@ -24423,13 +24441,13 @@
   <p:clrMapOvr>
     <a:masterClrMapping/>
   </p:clrMapOvr>
-  <p:transition xmlns:p14="http://schemas.microsoft.com/office/powerpoint/2010/main" spd="med">
+  <p:transition spd="med">
     <p:wipe dir="r"/>
   </p:transition>
   <p:timing>
     <p:tnLst>
       <p:par>
-        <p:cTn xmlns:p14="http://schemas.microsoft.com/office/powerpoint/2010/main" id="1" dur="indefinite" restart="never" nodeType="tmRoot"/>
+        <p:cTn id="1" dur="indefinite" restart="never" nodeType="tmRoot"/>
       </p:par>
     </p:tnLst>
   </p:timing>
@@ -24655,11 +24673,11 @@
   <p:clrMapOvr>
     <a:masterClrMapping/>
   </p:clrMapOvr>
-  <p:transition xmlns:p14="http://schemas.microsoft.com/office/powerpoint/2010/main" spd="med"/>
+  <p:transition spd="med"/>
   <p:timing>
     <p:tnLst>
       <p:par>
-        <p:cTn xmlns:p14="http://schemas.microsoft.com/office/powerpoint/2010/main" id="1" dur="indefinite" restart="never" nodeType="tmRoot"/>
+        <p:cTn id="1" dur="indefinite" restart="never" nodeType="tmRoot"/>
       </p:par>
     </p:tnLst>
   </p:timing>
@@ -24724,11 +24742,7 @@
           <a:p>
             <a:r>
               <a:rPr lang="en-US" dirty="0" smtClean="0"/>
-              <a:t>Smith-Waterman </a:t>
-            </a:r>
-            <a:r>
-              <a:rPr lang="en-US" dirty="0" smtClean="0"/>
-              <a:t>Alignment Algorithm</a:t>
+              <a:t>Smith-Waterman Alignment Algorithm</a:t>
             </a:r>
             <a:endParaRPr lang="en-US" dirty="0"/>
           </a:p>
@@ -24811,21 +24825,13 @@
           <a:p>
             <a:r>
               <a:rPr lang="en-US" dirty="0" smtClean="0"/>
-              <a:t>Match score (s): </a:t>
-            </a:r>
-            <a:r>
-              <a:rPr lang="en-US" dirty="0" smtClean="0"/>
-              <a:t>+1</a:t>
-            </a:r>
-          </a:p>
-          <a:p>
-            <a:r>
-              <a:rPr lang="en-US" dirty="0" smtClean="0"/>
-              <a:t>Mismatch score (s): </a:t>
-            </a:r>
-            <a:r>
-              <a:rPr lang="en-US" dirty="0" smtClean="0"/>
-              <a:t>0</a:t>
+              <a:t>Match score (s): +1</a:t>
+            </a:r>
+          </a:p>
+          <a:p>
+            <a:r>
+              <a:rPr lang="en-US" dirty="0" smtClean="0"/>
+              <a:t>Mismatch score (s): 0</a:t>
             </a:r>
           </a:p>
           <a:p>
@@ -24835,11 +24841,7 @@
             </a:r>
             <a:r>
               <a:rPr lang="en-US" dirty="0" smtClean="0"/>
-              <a:t> penalty (-d): </a:t>
-            </a:r>
-            <a:r>
-              <a:rPr lang="en-US" dirty="0" smtClean="0"/>
-              <a:t>-1</a:t>
+              <a:t> penalty (-d): -1</a:t>
             </a:r>
           </a:p>
         </p:txBody>
@@ -26077,11 +26079,11 @@
   <p:clrMapOvr>
     <a:masterClrMapping/>
   </p:clrMapOvr>
-  <p:transition xmlns:p14="http://schemas.microsoft.com/office/powerpoint/2010/main" spd="med"/>
+  <p:transition spd="med"/>
   <p:timing>
     <p:tnLst>
       <p:par>
-        <p:cTn xmlns:p14="http://schemas.microsoft.com/office/powerpoint/2010/main" id="1" dur="indefinite" restart="never" nodeType="tmRoot"/>
+        <p:cTn id="1" dur="indefinite" restart="never" nodeType="tmRoot"/>
       </p:par>
     </p:tnLst>
   </p:timing>
@@ -26146,11 +26148,7 @@
           <a:p>
             <a:r>
               <a:rPr lang="en-US" dirty="0" smtClean="0"/>
-              <a:t>Smith-Waterman </a:t>
-            </a:r>
-            <a:r>
-              <a:rPr lang="en-US" dirty="0" smtClean="0"/>
-              <a:t>Alignment Algorithm</a:t>
+              <a:t>Smith-Waterman Alignment Algorithm</a:t>
             </a:r>
             <a:endParaRPr lang="en-US" dirty="0"/>
           </a:p>
@@ -27468,21 +27466,13 @@
           <a:p>
             <a:r>
               <a:rPr lang="en-US" dirty="0" smtClean="0"/>
-              <a:t>Match score (s): </a:t>
-            </a:r>
-            <a:r>
-              <a:rPr lang="en-US" dirty="0" smtClean="0"/>
-              <a:t>+1</a:t>
-            </a:r>
-          </a:p>
-          <a:p>
-            <a:r>
-              <a:rPr lang="en-US" dirty="0" smtClean="0"/>
-              <a:t>Mismatch score (s): </a:t>
-            </a:r>
-            <a:r>
-              <a:rPr lang="en-US" dirty="0" smtClean="0"/>
-              <a:t>0</a:t>
+              <a:t>Match score (s): +1</a:t>
+            </a:r>
+          </a:p>
+          <a:p>
+            <a:r>
+              <a:rPr lang="en-US" dirty="0" smtClean="0"/>
+              <a:t>Mismatch score (s): 0</a:t>
             </a:r>
           </a:p>
           <a:p>
@@ -27492,11 +27482,7 @@
             </a:r>
             <a:r>
               <a:rPr lang="en-US" dirty="0" smtClean="0"/>
-              <a:t> penalty (-d): </a:t>
-            </a:r>
-            <a:r>
-              <a:rPr lang="en-US" dirty="0" smtClean="0"/>
-              <a:t>-1</a:t>
+              <a:t> penalty (-d): -1</a:t>
             </a:r>
           </a:p>
         </p:txBody>
@@ -27511,11 +27497,11 @@
   <p:clrMapOvr>
     <a:masterClrMapping/>
   </p:clrMapOvr>
-  <p:transition xmlns:p14="http://schemas.microsoft.com/office/powerpoint/2010/main" spd="med"/>
+  <p:transition spd="med"/>
   <p:timing>
     <p:tnLst>
       <p:par>
-        <p:cTn xmlns:p14="http://schemas.microsoft.com/office/powerpoint/2010/main" id="1" dur="indefinite" restart="never" nodeType="tmRoot"/>
+        <p:cTn id="1" dur="indefinite" restart="never" nodeType="tmRoot"/>
       </p:par>
     </p:tnLst>
   </p:timing>
@@ -27580,11 +27566,7 @@
           <a:p>
             <a:r>
               <a:rPr lang="en-US" dirty="0" smtClean="0"/>
-              <a:t>Smith-Waterman </a:t>
-            </a:r>
-            <a:r>
-              <a:rPr lang="en-US" dirty="0" smtClean="0"/>
-              <a:t>Alignment Algorithm</a:t>
+              <a:t>Smith-Waterman Alignment Algorithm</a:t>
             </a:r>
             <a:endParaRPr lang="en-US" dirty="0"/>
           </a:p>
@@ -29078,21 +29060,13 @@
           <a:p>
             <a:r>
               <a:rPr lang="en-US" dirty="0" smtClean="0"/>
-              <a:t>Match score (s): </a:t>
-            </a:r>
-            <a:r>
-              <a:rPr lang="en-US" dirty="0" smtClean="0"/>
-              <a:t>+1</a:t>
-            </a:r>
-          </a:p>
-          <a:p>
-            <a:r>
-              <a:rPr lang="en-US" dirty="0" smtClean="0"/>
-              <a:t>Mismatch score (s): </a:t>
-            </a:r>
-            <a:r>
-              <a:rPr lang="en-US" dirty="0" smtClean="0"/>
-              <a:t>0</a:t>
+              <a:t>Match score (s): +1</a:t>
+            </a:r>
+          </a:p>
+          <a:p>
+            <a:r>
+              <a:rPr lang="en-US" dirty="0" smtClean="0"/>
+              <a:t>Mismatch score (s): 0</a:t>
             </a:r>
           </a:p>
           <a:p>
@@ -29102,11 +29076,7 @@
             </a:r>
             <a:r>
               <a:rPr lang="en-US" dirty="0" smtClean="0"/>
-              <a:t> penalty (-d): </a:t>
-            </a:r>
-            <a:r>
-              <a:rPr lang="en-US" dirty="0" smtClean="0"/>
-              <a:t>-1</a:t>
+              <a:t> penalty (-d): -1</a:t>
             </a:r>
           </a:p>
         </p:txBody>
@@ -29121,11 +29091,11 @@
   <p:clrMapOvr>
     <a:masterClrMapping/>
   </p:clrMapOvr>
-  <p:transition xmlns:p14="http://schemas.microsoft.com/office/powerpoint/2010/main" spd="med"/>
+  <p:transition spd="med"/>
   <p:timing>
     <p:tnLst>
       <p:par>
-        <p:cTn xmlns:p14="http://schemas.microsoft.com/office/powerpoint/2010/main" id="1" dur="indefinite" restart="never" nodeType="tmRoot"/>
+        <p:cTn id="1" dur="indefinite" restart="never" nodeType="tmRoot"/>
       </p:par>
     </p:tnLst>
   </p:timing>

</xml_diff>

<commit_message>
Updates dates in lecture slides (fixes #3).
</commit_message>
<xml_diff>
--- a/lectures/EBI_NGS_rsvc_slides.pptx
+++ b/lectures/EBI_NGS_rsvc_slides.pptx
@@ -4700,7 +4700,7 @@
             </a:r>
             <a:r>
               <a:rPr lang="en-GB" sz="1000" dirty="0" smtClean="0"/>
-              <a:t>6</a:t>
+              <a:t>5</a:t>
             </a:r>
             <a:r>
               <a:rPr lang="en-GB" sz="1000" baseline="30000" dirty="0" smtClean="0"/>
@@ -4708,7 +4708,7 @@
             </a:r>
             <a:r>
               <a:rPr lang="en-GB" sz="1000" dirty="0" smtClean="0"/>
-              <a:t> April 2016</a:t>
+              <a:t> October 2016</a:t>
             </a:r>
             <a:endParaRPr lang="en-GB" sz="1000" dirty="0"/>
           </a:p>

</xml_diff>

<commit_message>
Updates dates in lecture slides for April 2017 course.
</commit_message>
<xml_diff>
--- a/lectures/EBI_NGS_rsvc_slides.pptx
+++ b/lectures/EBI_NGS_rsvc_slides.pptx
@@ -261,7 +261,7 @@
           <a:p>
             <a:fld id="{683B11D8-A7E4-EF43-B6E1-02D8D0F96BD3}" type="datetimeFigureOut">
               <a:rPr lang="en-US" smtClean="0"/>
-              <a:t>9/26/16</a:t>
+              <a:t>3/8/17</a:t>
             </a:fld>
             <a:endParaRPr lang="en-US"/>
           </a:p>
@@ -427,7 +427,7 @@
             <a:fld id="{62009DDE-F922-854C-BEFF-CE1DF0F32BA2}" type="datetimeFigureOut">
               <a:rPr lang="en-US" smtClean="0"/>
               <a:pPr/>
-              <a:t>9/26/16</a:t>
+              <a:t>3/8/17</a:t>
             </a:fld>
             <a:endParaRPr lang="en-US"/>
           </a:p>
@@ -3089,7 +3089,7 @@
             <a:fld id="{839ABAFC-AAE2-164B-92D4-13A10F0236EE}" type="datetimeFigureOut">
               <a:rPr lang="en-US" smtClean="0"/>
               <a:pPr/>
-              <a:t>9/26/16</a:t>
+              <a:t>3/8/17</a:t>
             </a:fld>
             <a:endParaRPr lang="en-US"/>
           </a:p>
@@ -4700,7 +4700,7 @@
             </a:r>
             <a:r>
               <a:rPr lang="en-GB" sz="1000" dirty="0" smtClean="0"/>
-              <a:t>5</a:t>
+              <a:t>6</a:t>
             </a:r>
             <a:r>
               <a:rPr lang="en-GB" sz="1000" baseline="30000" dirty="0" smtClean="0"/>
@@ -4708,7 +4708,7 @@
             </a:r>
             <a:r>
               <a:rPr lang="en-GB" sz="1000" dirty="0" smtClean="0"/>
-              <a:t> October 2016</a:t>
+              <a:t> April 2017</a:t>
             </a:r>
             <a:endParaRPr lang="en-GB" sz="1000" dirty="0"/>
           </a:p>
@@ -7864,21 +7864,7 @@
                 <a:latin typeface="Courier"/>
                 <a:cs typeface="Courier"/>
               </a:rPr>
-              <a:t> index </a:t>
-            </a:r>
-            <a:r>
-              <a:rPr lang="en-US" dirty="0" smtClean="0">
-                <a:latin typeface="Courier"/>
-                <a:cs typeface="Courier"/>
-              </a:rPr>
-              <a:t>[options] </a:t>
-            </a:r>
-            <a:r>
-              <a:rPr lang="en-US" dirty="0" smtClean="0">
-                <a:latin typeface="Courier"/>
-                <a:cs typeface="Courier"/>
-              </a:rPr>
-              <a:t>&lt;</a:t>
+              <a:t> index [options] &lt;</a:t>
             </a:r>
             <a:r>
               <a:rPr lang="en-US" dirty="0" err="1" smtClean="0">
@@ -13248,14 +13234,14 @@
           </a:ln>
           <a:extLst>
             <a:ext uri="{909E8E84-426E-40dd-AFC4-6F175D3DCCD1}">
-              <a14:hiddenFill xmlns:a14="http://schemas.microsoft.com/office/drawing/2010/main" xmlns="">
+              <a14:hiddenFill xmlns="" xmlns:a14="http://schemas.microsoft.com/office/drawing/2010/main">
                 <a:solidFill>
                   <a:srgbClr val="FFFFFF"/>
                 </a:solidFill>
               </a14:hiddenFill>
             </a:ext>
             <a:ext uri="{91240B29-F687-4f45-9708-019B960494DF}">
-              <a14:hiddenLine xmlns:a14="http://schemas.microsoft.com/office/drawing/2010/main" xmlns="" w="9525">
+              <a14:hiddenLine xmlns="" xmlns:a14="http://schemas.microsoft.com/office/drawing/2010/main" w="9525">
                 <a:solidFill>
                   <a:srgbClr val="000000"/>
                 </a:solidFill>
@@ -13302,14 +13288,14 @@
           </a:ln>
           <a:extLst>
             <a:ext uri="{909E8E84-426E-40dd-AFC4-6F175D3DCCD1}">
-              <a14:hiddenFill xmlns:a14="http://schemas.microsoft.com/office/drawing/2010/main" xmlns="">
+              <a14:hiddenFill xmlns="" xmlns:a14="http://schemas.microsoft.com/office/drawing/2010/main">
                 <a:solidFill>
                   <a:srgbClr val="FFFFFF"/>
                 </a:solidFill>
               </a14:hiddenFill>
             </a:ext>
             <a:ext uri="{91240B29-F687-4f45-9708-019B960494DF}">
-              <a14:hiddenLine xmlns:a14="http://schemas.microsoft.com/office/drawing/2010/main" xmlns="" w="9525">
+              <a14:hiddenLine xmlns="" xmlns:a14="http://schemas.microsoft.com/office/drawing/2010/main" w="9525">
                 <a:solidFill>
                   <a:srgbClr val="000000"/>
                 </a:solidFill>
@@ -13356,14 +13342,14 @@
           </a:ln>
           <a:extLst>
             <a:ext uri="{909E8E84-426E-40dd-AFC4-6F175D3DCCD1}">
-              <a14:hiddenFill xmlns:a14="http://schemas.microsoft.com/office/drawing/2010/main" xmlns="">
+              <a14:hiddenFill xmlns="" xmlns:a14="http://schemas.microsoft.com/office/drawing/2010/main">
                 <a:solidFill>
                   <a:srgbClr val="FFFFFF"/>
                 </a:solidFill>
               </a14:hiddenFill>
             </a:ext>
             <a:ext uri="{91240B29-F687-4f45-9708-019B960494DF}">
-              <a14:hiddenLine xmlns:a14="http://schemas.microsoft.com/office/drawing/2010/main" xmlns="" w="9525">
+              <a14:hiddenLine xmlns="" xmlns:a14="http://schemas.microsoft.com/office/drawing/2010/main" w="9525">
                 <a:solidFill>
                   <a:srgbClr val="000000"/>
                 </a:solidFill>
@@ -13410,14 +13396,14 @@
           </a:ln>
           <a:extLst>
             <a:ext uri="{909E8E84-426E-40dd-AFC4-6F175D3DCCD1}">
-              <a14:hiddenFill xmlns:a14="http://schemas.microsoft.com/office/drawing/2010/main" xmlns="">
+              <a14:hiddenFill xmlns="" xmlns:a14="http://schemas.microsoft.com/office/drawing/2010/main">
                 <a:solidFill>
                   <a:srgbClr val="FFFFFF"/>
                 </a:solidFill>
               </a14:hiddenFill>
             </a:ext>
             <a:ext uri="{91240B29-F687-4f45-9708-019B960494DF}">
-              <a14:hiddenLine xmlns:a14="http://schemas.microsoft.com/office/drawing/2010/main" xmlns="" w="9525">
+              <a14:hiddenLine xmlns="" xmlns:a14="http://schemas.microsoft.com/office/drawing/2010/main" w="9525">
                 <a:solidFill>
                   <a:srgbClr val="000000"/>
                 </a:solidFill>
@@ -13470,14 +13456,14 @@
           </a:scene3d>
           <a:extLst>
             <a:ext uri="{909E8E84-426E-40dd-AFC4-6F175D3DCCD1}">
-              <a14:hiddenFill xmlns:a14="http://schemas.microsoft.com/office/drawing/2010/main" xmlns="">
+              <a14:hiddenFill xmlns="" xmlns:a14="http://schemas.microsoft.com/office/drawing/2010/main">
                 <a:solidFill>
                   <a:srgbClr val="FFFFFF"/>
                 </a:solidFill>
               </a14:hiddenFill>
             </a:ext>
             <a:ext uri="{91240B29-F687-4f45-9708-019B960494DF}">
-              <a14:hiddenLine xmlns:a14="http://schemas.microsoft.com/office/drawing/2010/main" xmlns="" w="9525">
+              <a14:hiddenLine xmlns="" xmlns:a14="http://schemas.microsoft.com/office/drawing/2010/main" w="9525">
                 <a:solidFill>
                   <a:srgbClr val="000000"/>
                 </a:solidFill>
@@ -16384,14 +16370,14 @@
           </a:ln>
           <a:extLst>
             <a:ext uri="{909E8E84-426E-40dd-AFC4-6F175D3DCCD1}">
-              <a14:hiddenFill xmlns:a14="http://schemas.microsoft.com/office/drawing/2010/main" xmlns="">
+              <a14:hiddenFill xmlns="" xmlns:a14="http://schemas.microsoft.com/office/drawing/2010/main">
                 <a:solidFill>
                   <a:srgbClr val="FFFFFF"/>
                 </a:solidFill>
               </a14:hiddenFill>
             </a:ext>
             <a:ext uri="{91240B29-F687-4f45-9708-019B960494DF}">
-              <a14:hiddenLine xmlns:a14="http://schemas.microsoft.com/office/drawing/2010/main" xmlns="" w="9525">
+              <a14:hiddenLine xmlns="" xmlns:a14="http://schemas.microsoft.com/office/drawing/2010/main" w="9525">
                 <a:solidFill>
                   <a:srgbClr val="000000"/>
                 </a:solidFill>
@@ -16438,14 +16424,14 @@
           </a:ln>
           <a:extLst>
             <a:ext uri="{909E8E84-426E-40dd-AFC4-6F175D3DCCD1}">
-              <a14:hiddenFill xmlns:a14="http://schemas.microsoft.com/office/drawing/2010/main" xmlns="">
+              <a14:hiddenFill xmlns="" xmlns:a14="http://schemas.microsoft.com/office/drawing/2010/main">
                 <a:solidFill>
                   <a:srgbClr val="FFFFFF"/>
                 </a:solidFill>
               </a14:hiddenFill>
             </a:ext>
             <a:ext uri="{91240B29-F687-4f45-9708-019B960494DF}">
-              <a14:hiddenLine xmlns:a14="http://schemas.microsoft.com/office/drawing/2010/main" xmlns="" w="9525">
+              <a14:hiddenLine xmlns="" xmlns:a14="http://schemas.microsoft.com/office/drawing/2010/main" w="9525">
                 <a:solidFill>
                   <a:srgbClr val="000000"/>
                 </a:solidFill>
@@ -16492,14 +16478,14 @@
           </a:ln>
           <a:extLst>
             <a:ext uri="{909E8E84-426E-40dd-AFC4-6F175D3DCCD1}">
-              <a14:hiddenFill xmlns:a14="http://schemas.microsoft.com/office/drawing/2010/main" xmlns="">
+              <a14:hiddenFill xmlns="" xmlns:a14="http://schemas.microsoft.com/office/drawing/2010/main">
                 <a:solidFill>
                   <a:srgbClr val="FFFFFF"/>
                 </a:solidFill>
               </a14:hiddenFill>
             </a:ext>
             <a:ext uri="{91240B29-F687-4f45-9708-019B960494DF}">
-              <a14:hiddenLine xmlns:a14="http://schemas.microsoft.com/office/drawing/2010/main" xmlns="" w="9525">
+              <a14:hiddenLine xmlns="" xmlns:a14="http://schemas.microsoft.com/office/drawing/2010/main" w="9525">
                 <a:solidFill>
                   <a:srgbClr val="000000"/>
                 </a:solidFill>
@@ -16546,14 +16532,14 @@
           </a:ln>
           <a:extLst>
             <a:ext uri="{909E8E84-426E-40dd-AFC4-6F175D3DCCD1}">
-              <a14:hiddenFill xmlns:a14="http://schemas.microsoft.com/office/drawing/2010/main" xmlns="">
+              <a14:hiddenFill xmlns="" xmlns:a14="http://schemas.microsoft.com/office/drawing/2010/main">
                 <a:solidFill>
                   <a:srgbClr val="FFFFFF"/>
                 </a:solidFill>
               </a14:hiddenFill>
             </a:ext>
             <a:ext uri="{91240B29-F687-4f45-9708-019B960494DF}">
-              <a14:hiddenLine xmlns:a14="http://schemas.microsoft.com/office/drawing/2010/main" xmlns="" w="9525">
+              <a14:hiddenLine xmlns="" xmlns:a14="http://schemas.microsoft.com/office/drawing/2010/main" w="9525">
                 <a:solidFill>
                   <a:srgbClr val="000000"/>
                 </a:solidFill>
@@ -16606,14 +16592,14 @@
           </a:scene3d>
           <a:extLst>
             <a:ext uri="{909E8E84-426E-40dd-AFC4-6F175D3DCCD1}">
-              <a14:hiddenFill xmlns:a14="http://schemas.microsoft.com/office/drawing/2010/main" xmlns="">
+              <a14:hiddenFill xmlns="" xmlns:a14="http://schemas.microsoft.com/office/drawing/2010/main">
                 <a:solidFill>
                   <a:srgbClr val="FFFFFF"/>
                 </a:solidFill>
               </a14:hiddenFill>
             </a:ext>
             <a:ext uri="{91240B29-F687-4f45-9708-019B960494DF}">
-              <a14:hiddenLine xmlns:a14="http://schemas.microsoft.com/office/drawing/2010/main" xmlns="" w="9525">
+              <a14:hiddenLine xmlns="" xmlns:a14="http://schemas.microsoft.com/office/drawing/2010/main" w="9525">
                 <a:solidFill>
                   <a:srgbClr val="000000"/>
                 </a:solidFill>
@@ -20742,14 +20728,14 @@
           </a:ln>
           <a:extLst>
             <a:ext uri="{909E8E84-426E-40dd-AFC4-6F175D3DCCD1}">
-              <a14:hiddenFill xmlns:a14="http://schemas.microsoft.com/office/drawing/2010/main" xmlns="">
+              <a14:hiddenFill xmlns="" xmlns:a14="http://schemas.microsoft.com/office/drawing/2010/main">
                 <a:solidFill>
                   <a:srgbClr val="FFFFFF"/>
                 </a:solidFill>
               </a14:hiddenFill>
             </a:ext>
             <a:ext uri="{91240B29-F687-4f45-9708-019B960494DF}">
-              <a14:hiddenLine xmlns:a14="http://schemas.microsoft.com/office/drawing/2010/main" xmlns="" w="9525">
+              <a14:hiddenLine xmlns="" xmlns:a14="http://schemas.microsoft.com/office/drawing/2010/main" w="9525">
                 <a:solidFill>
                   <a:srgbClr val="000000"/>
                 </a:solidFill>
@@ -20796,14 +20782,14 @@
           </a:ln>
           <a:extLst>
             <a:ext uri="{909E8E84-426E-40dd-AFC4-6F175D3DCCD1}">
-              <a14:hiddenFill xmlns:a14="http://schemas.microsoft.com/office/drawing/2010/main" xmlns="">
+              <a14:hiddenFill xmlns="" xmlns:a14="http://schemas.microsoft.com/office/drawing/2010/main">
                 <a:solidFill>
                   <a:srgbClr val="FFFFFF"/>
                 </a:solidFill>
               </a14:hiddenFill>
             </a:ext>
             <a:ext uri="{91240B29-F687-4f45-9708-019B960494DF}">
-              <a14:hiddenLine xmlns:a14="http://schemas.microsoft.com/office/drawing/2010/main" xmlns="" w="9525">
+              <a14:hiddenLine xmlns="" xmlns:a14="http://schemas.microsoft.com/office/drawing/2010/main" w="9525">
                 <a:solidFill>
                   <a:srgbClr val="000000"/>
                 </a:solidFill>
@@ -20850,14 +20836,14 @@
           </a:ln>
           <a:extLst>
             <a:ext uri="{909E8E84-426E-40dd-AFC4-6F175D3DCCD1}">
-              <a14:hiddenFill xmlns:a14="http://schemas.microsoft.com/office/drawing/2010/main" xmlns="">
+              <a14:hiddenFill xmlns="" xmlns:a14="http://schemas.microsoft.com/office/drawing/2010/main">
                 <a:solidFill>
                   <a:srgbClr val="FFFFFF"/>
                 </a:solidFill>
               </a14:hiddenFill>
             </a:ext>
             <a:ext uri="{91240B29-F687-4f45-9708-019B960494DF}">
-              <a14:hiddenLine xmlns:a14="http://schemas.microsoft.com/office/drawing/2010/main" xmlns="" w="9525">
+              <a14:hiddenLine xmlns="" xmlns:a14="http://schemas.microsoft.com/office/drawing/2010/main" w="9525">
                 <a:solidFill>
                   <a:srgbClr val="000000"/>
                 </a:solidFill>
@@ -20904,14 +20890,14 @@
           </a:ln>
           <a:extLst>
             <a:ext uri="{909E8E84-426E-40dd-AFC4-6F175D3DCCD1}">
-              <a14:hiddenFill xmlns:a14="http://schemas.microsoft.com/office/drawing/2010/main" xmlns="">
+              <a14:hiddenFill xmlns="" xmlns:a14="http://schemas.microsoft.com/office/drawing/2010/main">
                 <a:solidFill>
                   <a:srgbClr val="FFFFFF"/>
                 </a:solidFill>
               </a14:hiddenFill>
             </a:ext>
             <a:ext uri="{91240B29-F687-4f45-9708-019B960494DF}">
-              <a14:hiddenLine xmlns:a14="http://schemas.microsoft.com/office/drawing/2010/main" xmlns="" w="9525">
+              <a14:hiddenLine xmlns="" xmlns:a14="http://schemas.microsoft.com/office/drawing/2010/main" w="9525">
                 <a:solidFill>
                   <a:srgbClr val="000000"/>
                 </a:solidFill>
@@ -20964,14 +20950,14 @@
           </a:scene3d>
           <a:extLst>
             <a:ext uri="{909E8E84-426E-40dd-AFC4-6F175D3DCCD1}">
-              <a14:hiddenFill xmlns:a14="http://schemas.microsoft.com/office/drawing/2010/main" xmlns="">
+              <a14:hiddenFill xmlns="" xmlns:a14="http://schemas.microsoft.com/office/drawing/2010/main">
                 <a:solidFill>
                   <a:srgbClr val="FFFFFF"/>
                 </a:solidFill>
               </a14:hiddenFill>
             </a:ext>
             <a:ext uri="{91240B29-F687-4f45-9708-019B960494DF}">
-              <a14:hiddenLine xmlns:a14="http://schemas.microsoft.com/office/drawing/2010/main" xmlns="" w="9525">
+              <a14:hiddenLine xmlns="" xmlns:a14="http://schemas.microsoft.com/office/drawing/2010/main" w="9525">
                 <a:solidFill>
                   <a:srgbClr val="000000"/>
                 </a:solidFill>

</xml_diff>

<commit_message>
Corrects links on rsvc slides (fixes #7).
</commit_message>
<xml_diff>
--- a/lectures/EBI_NGS_rsvc_slides.pptx
+++ b/lectures/EBI_NGS_rsvc_slides.pptx
@@ -261,7 +261,7 @@
           <a:p>
             <a:fld id="{683B11D8-A7E4-EF43-B6E1-02D8D0F96BD3}" type="datetimeFigureOut">
               <a:rPr lang="en-US" smtClean="0"/>
-              <a:t>3/8/17</a:t>
+              <a:t>9/21/17</a:t>
             </a:fld>
             <a:endParaRPr lang="en-US"/>
           </a:p>
@@ -427,7 +427,7 @@
             <a:fld id="{62009DDE-F922-854C-BEFF-CE1DF0F32BA2}" type="datetimeFigureOut">
               <a:rPr lang="en-US" smtClean="0"/>
               <a:pPr/>
-              <a:t>3/8/17</a:t>
+              <a:t>9/21/17</a:t>
             </a:fld>
             <a:endParaRPr lang="en-US"/>
           </a:p>
@@ -3089,7 +3089,7 @@
             <a:fld id="{839ABAFC-AAE2-164B-92D4-13A10F0236EE}" type="datetimeFigureOut">
               <a:rPr lang="en-US" smtClean="0"/>
               <a:pPr/>
-              <a:t>3/8/17</a:t>
+              <a:t>9/21/17</a:t>
             </a:fld>
             <a:endParaRPr lang="en-US"/>
           </a:p>
@@ -13234,14 +13234,14 @@
           </a:ln>
           <a:extLst>
             <a:ext uri="{909E8E84-426E-40dd-AFC4-6F175D3DCCD1}">
-              <a14:hiddenFill xmlns="" xmlns:a14="http://schemas.microsoft.com/office/drawing/2010/main">
+              <a14:hiddenFill xmlns:a14="http://schemas.microsoft.com/office/drawing/2010/main" xmlns="">
                 <a:solidFill>
                   <a:srgbClr val="FFFFFF"/>
                 </a:solidFill>
               </a14:hiddenFill>
             </a:ext>
             <a:ext uri="{91240B29-F687-4f45-9708-019B960494DF}">
-              <a14:hiddenLine xmlns="" xmlns:a14="http://schemas.microsoft.com/office/drawing/2010/main" w="9525">
+              <a14:hiddenLine xmlns:a14="http://schemas.microsoft.com/office/drawing/2010/main" xmlns="" w="9525">
                 <a:solidFill>
                   <a:srgbClr val="000000"/>
                 </a:solidFill>
@@ -13288,14 +13288,14 @@
           </a:ln>
           <a:extLst>
             <a:ext uri="{909E8E84-426E-40dd-AFC4-6F175D3DCCD1}">
-              <a14:hiddenFill xmlns="" xmlns:a14="http://schemas.microsoft.com/office/drawing/2010/main">
+              <a14:hiddenFill xmlns:a14="http://schemas.microsoft.com/office/drawing/2010/main" xmlns="">
                 <a:solidFill>
                   <a:srgbClr val="FFFFFF"/>
                 </a:solidFill>
               </a14:hiddenFill>
             </a:ext>
             <a:ext uri="{91240B29-F687-4f45-9708-019B960494DF}">
-              <a14:hiddenLine xmlns="" xmlns:a14="http://schemas.microsoft.com/office/drawing/2010/main" w="9525">
+              <a14:hiddenLine xmlns:a14="http://schemas.microsoft.com/office/drawing/2010/main" xmlns="" w="9525">
                 <a:solidFill>
                   <a:srgbClr val="000000"/>
                 </a:solidFill>
@@ -13342,14 +13342,14 @@
           </a:ln>
           <a:extLst>
             <a:ext uri="{909E8E84-426E-40dd-AFC4-6F175D3DCCD1}">
-              <a14:hiddenFill xmlns="" xmlns:a14="http://schemas.microsoft.com/office/drawing/2010/main">
+              <a14:hiddenFill xmlns:a14="http://schemas.microsoft.com/office/drawing/2010/main" xmlns="">
                 <a:solidFill>
                   <a:srgbClr val="FFFFFF"/>
                 </a:solidFill>
               </a14:hiddenFill>
             </a:ext>
             <a:ext uri="{91240B29-F687-4f45-9708-019B960494DF}">
-              <a14:hiddenLine xmlns="" xmlns:a14="http://schemas.microsoft.com/office/drawing/2010/main" w="9525">
+              <a14:hiddenLine xmlns:a14="http://schemas.microsoft.com/office/drawing/2010/main" xmlns="" w="9525">
                 <a:solidFill>
                   <a:srgbClr val="000000"/>
                 </a:solidFill>
@@ -13396,14 +13396,14 @@
           </a:ln>
           <a:extLst>
             <a:ext uri="{909E8E84-426E-40dd-AFC4-6F175D3DCCD1}">
-              <a14:hiddenFill xmlns="" xmlns:a14="http://schemas.microsoft.com/office/drawing/2010/main">
+              <a14:hiddenFill xmlns:a14="http://schemas.microsoft.com/office/drawing/2010/main" xmlns="">
                 <a:solidFill>
                   <a:srgbClr val="FFFFFF"/>
                 </a:solidFill>
               </a14:hiddenFill>
             </a:ext>
             <a:ext uri="{91240B29-F687-4f45-9708-019B960494DF}">
-              <a14:hiddenLine xmlns="" xmlns:a14="http://schemas.microsoft.com/office/drawing/2010/main" w="9525">
+              <a14:hiddenLine xmlns:a14="http://schemas.microsoft.com/office/drawing/2010/main" xmlns="" w="9525">
                 <a:solidFill>
                   <a:srgbClr val="000000"/>
                 </a:solidFill>
@@ -13456,14 +13456,14 @@
           </a:scene3d>
           <a:extLst>
             <a:ext uri="{909E8E84-426E-40dd-AFC4-6F175D3DCCD1}">
-              <a14:hiddenFill xmlns="" xmlns:a14="http://schemas.microsoft.com/office/drawing/2010/main">
+              <a14:hiddenFill xmlns:a14="http://schemas.microsoft.com/office/drawing/2010/main" xmlns="">
                 <a:solidFill>
                   <a:srgbClr val="FFFFFF"/>
                 </a:solidFill>
               </a14:hiddenFill>
             </a:ext>
             <a:ext uri="{91240B29-F687-4f45-9708-019B960494DF}">
-              <a14:hiddenLine xmlns="" xmlns:a14="http://schemas.microsoft.com/office/drawing/2010/main" w="9525">
+              <a14:hiddenLine xmlns:a14="http://schemas.microsoft.com/office/drawing/2010/main" xmlns="" w="9525">
                 <a:solidFill>
                   <a:srgbClr val="000000"/>
                 </a:solidFill>
@@ -16370,14 +16370,14 @@
           </a:ln>
           <a:extLst>
             <a:ext uri="{909E8E84-426E-40dd-AFC4-6F175D3DCCD1}">
-              <a14:hiddenFill xmlns="" xmlns:a14="http://schemas.microsoft.com/office/drawing/2010/main">
+              <a14:hiddenFill xmlns:a14="http://schemas.microsoft.com/office/drawing/2010/main" xmlns="">
                 <a:solidFill>
                   <a:srgbClr val="FFFFFF"/>
                 </a:solidFill>
               </a14:hiddenFill>
             </a:ext>
             <a:ext uri="{91240B29-F687-4f45-9708-019B960494DF}">
-              <a14:hiddenLine xmlns="" xmlns:a14="http://schemas.microsoft.com/office/drawing/2010/main" w="9525">
+              <a14:hiddenLine xmlns:a14="http://schemas.microsoft.com/office/drawing/2010/main" xmlns="" w="9525">
                 <a:solidFill>
                   <a:srgbClr val="000000"/>
                 </a:solidFill>
@@ -16424,14 +16424,14 @@
           </a:ln>
           <a:extLst>
             <a:ext uri="{909E8E84-426E-40dd-AFC4-6F175D3DCCD1}">
-              <a14:hiddenFill xmlns="" xmlns:a14="http://schemas.microsoft.com/office/drawing/2010/main">
+              <a14:hiddenFill xmlns:a14="http://schemas.microsoft.com/office/drawing/2010/main" xmlns="">
                 <a:solidFill>
                   <a:srgbClr val="FFFFFF"/>
                 </a:solidFill>
               </a14:hiddenFill>
             </a:ext>
             <a:ext uri="{91240B29-F687-4f45-9708-019B960494DF}">
-              <a14:hiddenLine xmlns="" xmlns:a14="http://schemas.microsoft.com/office/drawing/2010/main" w="9525">
+              <a14:hiddenLine xmlns:a14="http://schemas.microsoft.com/office/drawing/2010/main" xmlns="" w="9525">
                 <a:solidFill>
                   <a:srgbClr val="000000"/>
                 </a:solidFill>
@@ -16478,14 +16478,14 @@
           </a:ln>
           <a:extLst>
             <a:ext uri="{909E8E84-426E-40dd-AFC4-6F175D3DCCD1}">
-              <a14:hiddenFill xmlns="" xmlns:a14="http://schemas.microsoft.com/office/drawing/2010/main">
+              <a14:hiddenFill xmlns:a14="http://schemas.microsoft.com/office/drawing/2010/main" xmlns="">
                 <a:solidFill>
                   <a:srgbClr val="FFFFFF"/>
                 </a:solidFill>
               </a14:hiddenFill>
             </a:ext>
             <a:ext uri="{91240B29-F687-4f45-9708-019B960494DF}">
-              <a14:hiddenLine xmlns="" xmlns:a14="http://schemas.microsoft.com/office/drawing/2010/main" w="9525">
+              <a14:hiddenLine xmlns:a14="http://schemas.microsoft.com/office/drawing/2010/main" xmlns="" w="9525">
                 <a:solidFill>
                   <a:srgbClr val="000000"/>
                 </a:solidFill>
@@ -16532,14 +16532,14 @@
           </a:ln>
           <a:extLst>
             <a:ext uri="{909E8E84-426E-40dd-AFC4-6F175D3DCCD1}">
-              <a14:hiddenFill xmlns="" xmlns:a14="http://schemas.microsoft.com/office/drawing/2010/main">
+              <a14:hiddenFill xmlns:a14="http://schemas.microsoft.com/office/drawing/2010/main" xmlns="">
                 <a:solidFill>
                   <a:srgbClr val="FFFFFF"/>
                 </a:solidFill>
               </a14:hiddenFill>
             </a:ext>
             <a:ext uri="{91240B29-F687-4f45-9708-019B960494DF}">
-              <a14:hiddenLine xmlns="" xmlns:a14="http://schemas.microsoft.com/office/drawing/2010/main" w="9525">
+              <a14:hiddenLine xmlns:a14="http://schemas.microsoft.com/office/drawing/2010/main" xmlns="" w="9525">
                 <a:solidFill>
                   <a:srgbClr val="000000"/>
                 </a:solidFill>
@@ -16592,14 +16592,14 @@
           </a:scene3d>
           <a:extLst>
             <a:ext uri="{909E8E84-426E-40dd-AFC4-6F175D3DCCD1}">
-              <a14:hiddenFill xmlns="" xmlns:a14="http://schemas.microsoft.com/office/drawing/2010/main">
+              <a14:hiddenFill xmlns:a14="http://schemas.microsoft.com/office/drawing/2010/main" xmlns="">
                 <a:solidFill>
                   <a:srgbClr val="FFFFFF"/>
                 </a:solidFill>
               </a14:hiddenFill>
             </a:ext>
             <a:ext uri="{91240B29-F687-4f45-9708-019B960494DF}">
-              <a14:hiddenLine xmlns="" xmlns:a14="http://schemas.microsoft.com/office/drawing/2010/main" w="9525">
+              <a14:hiddenLine xmlns:a14="http://schemas.microsoft.com/office/drawing/2010/main" xmlns="" w="9525">
                 <a:solidFill>
                   <a:srgbClr val="000000"/>
                 </a:solidFill>
@@ -20728,14 +20728,14 @@
           </a:ln>
           <a:extLst>
             <a:ext uri="{909E8E84-426E-40dd-AFC4-6F175D3DCCD1}">
-              <a14:hiddenFill xmlns="" xmlns:a14="http://schemas.microsoft.com/office/drawing/2010/main">
+              <a14:hiddenFill xmlns:a14="http://schemas.microsoft.com/office/drawing/2010/main" xmlns="">
                 <a:solidFill>
                   <a:srgbClr val="FFFFFF"/>
                 </a:solidFill>
               </a14:hiddenFill>
             </a:ext>
             <a:ext uri="{91240B29-F687-4f45-9708-019B960494DF}">
-              <a14:hiddenLine xmlns="" xmlns:a14="http://schemas.microsoft.com/office/drawing/2010/main" w="9525">
+              <a14:hiddenLine xmlns:a14="http://schemas.microsoft.com/office/drawing/2010/main" xmlns="" w="9525">
                 <a:solidFill>
                   <a:srgbClr val="000000"/>
                 </a:solidFill>
@@ -20782,14 +20782,14 @@
           </a:ln>
           <a:extLst>
             <a:ext uri="{909E8E84-426E-40dd-AFC4-6F175D3DCCD1}">
-              <a14:hiddenFill xmlns="" xmlns:a14="http://schemas.microsoft.com/office/drawing/2010/main">
+              <a14:hiddenFill xmlns:a14="http://schemas.microsoft.com/office/drawing/2010/main" xmlns="">
                 <a:solidFill>
                   <a:srgbClr val="FFFFFF"/>
                 </a:solidFill>
               </a14:hiddenFill>
             </a:ext>
             <a:ext uri="{91240B29-F687-4f45-9708-019B960494DF}">
-              <a14:hiddenLine xmlns="" xmlns:a14="http://schemas.microsoft.com/office/drawing/2010/main" w="9525">
+              <a14:hiddenLine xmlns:a14="http://schemas.microsoft.com/office/drawing/2010/main" xmlns="" w="9525">
                 <a:solidFill>
                   <a:srgbClr val="000000"/>
                 </a:solidFill>
@@ -20836,14 +20836,14 @@
           </a:ln>
           <a:extLst>
             <a:ext uri="{909E8E84-426E-40dd-AFC4-6F175D3DCCD1}">
-              <a14:hiddenFill xmlns="" xmlns:a14="http://schemas.microsoft.com/office/drawing/2010/main">
+              <a14:hiddenFill xmlns:a14="http://schemas.microsoft.com/office/drawing/2010/main" xmlns="">
                 <a:solidFill>
                   <a:srgbClr val="FFFFFF"/>
                 </a:solidFill>
               </a14:hiddenFill>
             </a:ext>
             <a:ext uri="{91240B29-F687-4f45-9708-019B960494DF}">
-              <a14:hiddenLine xmlns="" xmlns:a14="http://schemas.microsoft.com/office/drawing/2010/main" w="9525">
+              <a14:hiddenLine xmlns:a14="http://schemas.microsoft.com/office/drawing/2010/main" xmlns="" w="9525">
                 <a:solidFill>
                   <a:srgbClr val="000000"/>
                 </a:solidFill>
@@ -20890,14 +20890,14 @@
           </a:ln>
           <a:extLst>
             <a:ext uri="{909E8E84-426E-40dd-AFC4-6F175D3DCCD1}">
-              <a14:hiddenFill xmlns="" xmlns:a14="http://schemas.microsoft.com/office/drawing/2010/main">
+              <a14:hiddenFill xmlns:a14="http://schemas.microsoft.com/office/drawing/2010/main" xmlns="">
                 <a:solidFill>
                   <a:srgbClr val="FFFFFF"/>
                 </a:solidFill>
               </a14:hiddenFill>
             </a:ext>
             <a:ext uri="{91240B29-F687-4f45-9708-019B960494DF}">
-              <a14:hiddenLine xmlns="" xmlns:a14="http://schemas.microsoft.com/office/drawing/2010/main" w="9525">
+              <a14:hiddenLine xmlns:a14="http://schemas.microsoft.com/office/drawing/2010/main" xmlns="" w="9525">
                 <a:solidFill>
                   <a:srgbClr val="000000"/>
                 </a:solidFill>
@@ -20950,14 +20950,14 @@
           </a:scene3d>
           <a:extLst>
             <a:ext uri="{909E8E84-426E-40dd-AFC4-6F175D3DCCD1}">
-              <a14:hiddenFill xmlns="" xmlns:a14="http://schemas.microsoft.com/office/drawing/2010/main">
+              <a14:hiddenFill xmlns:a14="http://schemas.microsoft.com/office/drawing/2010/main" xmlns="">
                 <a:solidFill>
                   <a:srgbClr val="FFFFFF"/>
                 </a:solidFill>
               </a14:hiddenFill>
             </a:ext>
             <a:ext uri="{91240B29-F687-4f45-9708-019B960494DF}">
-              <a14:hiddenLine xmlns="" xmlns:a14="http://schemas.microsoft.com/office/drawing/2010/main" w="9525">
+              <a14:hiddenLine xmlns:a14="http://schemas.microsoft.com/office/drawing/2010/main" xmlns="" w="9525">
                 <a:solidFill>
                   <a:srgbClr val="000000"/>
                 </a:solidFill>
@@ -21902,116 +21902,219 @@
           <a:lstStyle/>
           <a:p>
             <a:r>
-              <a:rPr lang="en-US" dirty="0" smtClean="0"/>
+              <a:rPr lang="en-US" sz="1800" dirty="0" smtClean="0"/>
               <a:t>Alignment</a:t>
             </a:r>
           </a:p>
           <a:p>
             <a:pPr lvl="1"/>
             <a:r>
-              <a:rPr lang="en-US" dirty="0" smtClean="0"/>
-              <a:t>BWA: http://bio-</a:t>
-            </a:r>
-            <a:r>
-              <a:rPr lang="en-US" dirty="0" err="1" smtClean="0"/>
-              <a:t>bwa.sourceforge.net/bwa.shtml</a:t>
+              <a:rPr lang="en-US" sz="1600" dirty="0" smtClean="0"/>
+              <a:t>BWA: </a:t>
+            </a:r>
+            <a:r>
+              <a:rPr lang="en-US" sz="1600" dirty="0" smtClean="0">
+                <a:hlinkClick r:id="rId2"/>
+              </a:rPr>
+              <a:t>http://</a:t>
+            </a:r>
+            <a:r>
+              <a:rPr lang="en-US" sz="1600" dirty="0" smtClean="0">
+                <a:hlinkClick r:id="rId2"/>
+              </a:rPr>
+              <a:t>bio-bwa.sourceforge.net/bwa.shtml</a:t>
+            </a:r>
+            <a:endParaRPr lang="en-US" sz="1600" dirty="0" smtClean="0"/>
+          </a:p>
+          <a:p>
+            <a:pPr lvl="1"/>
+            <a:r>
+              <a:rPr lang="en-US" sz="1600" dirty="0" smtClean="0"/>
+              <a:t>Smalt: </a:t>
+            </a:r>
+            <a:r>
+              <a:rPr lang="en-US" sz="1600" dirty="0">
+                <a:hlinkClick r:id="rId3"/>
+              </a:rPr>
+              <a:t>http://</a:t>
+            </a:r>
+            <a:r>
+              <a:rPr lang="en-US" sz="1600" dirty="0" smtClean="0">
+                <a:hlinkClick r:id="rId3"/>
+              </a:rPr>
+              <a:t>www.sanger.ac.uk/science/tools/smalt-0</a:t>
+            </a:r>
+            <a:endParaRPr lang="en-US" sz="1600" dirty="0" smtClean="0"/>
+          </a:p>
+          <a:p>
+            <a:pPr lvl="1"/>
+            <a:r>
+              <a:rPr lang="en-US" sz="1600" dirty="0" err="1" smtClean="0"/>
+              <a:t>Stampy</a:t>
+            </a:r>
+            <a:r>
+              <a:rPr lang="en-US" sz="1600" dirty="0" smtClean="0"/>
+              <a:t>: </a:t>
+            </a:r>
+            <a:r>
+              <a:rPr lang="en-US" sz="1600" dirty="0" smtClean="0">
+                <a:hlinkClick r:id="rId4"/>
+              </a:rPr>
+              <a:t>http://www.well.ox.ac.uk/project-stampy</a:t>
+            </a:r>
+            <a:r>
+              <a:rPr lang="en-US" sz="1600" dirty="0" smtClean="0"/>
+              <a:t/>
+            </a:r>
+            <a:br>
+              <a:rPr lang="en-US" sz="1600" dirty="0" smtClean="0"/>
+            </a:br>
+            <a:endParaRPr lang="en-US" sz="1600" dirty="0" smtClean="0"/>
+          </a:p>
+          <a:p>
+            <a:r>
+              <a:rPr lang="en-US" sz="1800" dirty="0" smtClean="0"/>
+              <a:t>BAM </a:t>
+            </a:r>
+            <a:r>
+              <a:rPr lang="en-US" sz="1800" dirty="0" smtClean="0"/>
+              <a:t>Improvement</a:t>
+            </a:r>
+          </a:p>
+          <a:p>
+            <a:pPr lvl="1"/>
+            <a:r>
+              <a:rPr lang="en-US" sz="1600" dirty="0" smtClean="0"/>
+              <a:t>Realignment (GATK</a:t>
+            </a:r>
+            <a:r>
+              <a:rPr lang="en-US" sz="1600" dirty="0" smtClean="0"/>
+              <a:t>):</a:t>
+            </a:r>
+            <a:br>
+              <a:rPr lang="en-US" sz="1600" dirty="0" smtClean="0"/>
+            </a:br>
+            <a:r>
+              <a:rPr lang="en-US" sz="1600" dirty="0" smtClean="0">
+                <a:hlinkClick r:id="rId5"/>
+              </a:rPr>
+              <a:t>https://software.broadinstitute.org/gatk/documentation/tooldocs/current/org_broadinstitute_gatk_tools_walkers_indels_IndelRealigner.php</a:t>
+            </a:r>
+            <a:endParaRPr lang="en-US" sz="1600" dirty="0" smtClean="0"/>
+          </a:p>
+          <a:p>
+            <a:pPr lvl="1"/>
+            <a:r>
+              <a:rPr lang="en-US" sz="1600" dirty="0" smtClean="0"/>
+              <a:t>Recalibration</a:t>
+            </a:r>
+            <a:r>
+              <a:rPr lang="en-US" sz="1600" dirty="0" smtClean="0"/>
+              <a:t>:</a:t>
+            </a:r>
+            <a:br>
+              <a:rPr lang="en-US" sz="1600" dirty="0" smtClean="0"/>
+            </a:br>
+            <a:r>
+              <a:rPr lang="en-US" sz="1600" dirty="0" smtClean="0">
+                <a:hlinkClick r:id="rId6"/>
+              </a:rPr>
+              <a:t>https</a:t>
+            </a:r>
+            <a:r>
+              <a:rPr lang="en-US" sz="1600" dirty="0">
+                <a:hlinkClick r:id="rId6"/>
+              </a:rPr>
+              <a:t>://</a:t>
+            </a:r>
+            <a:r>
+              <a:rPr lang="en-US" sz="1600" dirty="0" smtClean="0">
+                <a:hlinkClick r:id="rId6"/>
+              </a:rPr>
+              <a:t>software.broadinstitute.org/gatk/documentation/tooldocs/current/org_broadinstitute_gatk_tools_walkers_variantrecalibration_VariantRecalibrator.php</a:t>
+            </a:r>
+            <a:endParaRPr lang="en-US" sz="1600" dirty="0" smtClean="0"/>
+          </a:p>
+          <a:p>
+            <a:pPr lvl="1"/>
+            <a:r>
+              <a:rPr lang="en-US" sz="1600" dirty="0" smtClean="0"/>
+              <a:t>Library </a:t>
+            </a:r>
+            <a:r>
+              <a:rPr lang="en-US" sz="1600" dirty="0" smtClean="0"/>
+              <a:t>Merging</a:t>
+            </a:r>
+          </a:p>
+          <a:p>
+            <a:pPr lvl="1"/>
+            <a:r>
+              <a:rPr lang="en-US" sz="1600" dirty="0" smtClean="0"/>
+              <a:t>BAM Merging (Picard</a:t>
+            </a:r>
+            <a:r>
+              <a:rPr lang="en-US" sz="1600" dirty="0" smtClean="0"/>
+              <a:t>):</a:t>
+            </a:r>
+            <a:br>
+              <a:rPr lang="en-US" sz="1600" dirty="0" smtClean="0"/>
+            </a:br>
+            <a:r>
+              <a:rPr lang="en-US" sz="1600" dirty="0" smtClean="0">
+                <a:hlinkClick r:id="rId7"/>
+              </a:rPr>
+              <a:t>http</a:t>
+            </a:r>
+            <a:r>
+              <a:rPr lang="en-US" sz="1600" dirty="0">
+                <a:hlinkClick r:id="rId7"/>
+              </a:rPr>
+              <a:t>://</a:t>
+            </a:r>
+            <a:r>
+              <a:rPr lang="en-US" sz="1600" dirty="0" smtClean="0">
+                <a:hlinkClick r:id="rId7"/>
+              </a:rPr>
+              <a:t>broadinstitute.github.io/picard/command-line-overview.html#MergeSamFiles</a:t>
+            </a:r>
+            <a:endParaRPr lang="en-US" sz="1600" dirty="0" smtClean="0"/>
+          </a:p>
+          <a:p>
+            <a:pPr lvl="1"/>
+            <a:r>
+              <a:rPr lang="en-US" sz="1600" dirty="0" smtClean="0"/>
+              <a:t>Duplicate </a:t>
+            </a:r>
+            <a:r>
+              <a:rPr lang="en-US" sz="1600" dirty="0" smtClean="0"/>
+              <a:t>Marking/removal (Picard</a:t>
+            </a:r>
+            <a:r>
+              <a:rPr lang="en-US" sz="1600" dirty="0" smtClean="0"/>
+              <a:t>):</a:t>
+            </a:r>
+            <a:br>
+              <a:rPr lang="en-US" sz="1600" dirty="0" smtClean="0"/>
+            </a:br>
+            <a:r>
+              <a:rPr lang="en-US" sz="1600" dirty="0" smtClean="0">
+                <a:hlinkClick r:id="rId8"/>
+              </a:rPr>
+              <a:t>http</a:t>
+            </a:r>
+            <a:r>
+              <a:rPr lang="en-US" sz="1600" dirty="0">
+                <a:hlinkClick r:id="rId8"/>
+              </a:rPr>
+              <a:t>://</a:t>
+            </a:r>
+            <a:r>
+              <a:rPr lang="en-US" sz="1600" dirty="0" smtClean="0">
+                <a:hlinkClick r:id="rId8"/>
+              </a:rPr>
+              <a:t>broadinstitute.github.io/picard/command-line-overview.html#MarkDuplicates</a:t>
             </a:r>
             <a:endParaRPr lang="en-US" dirty="0" smtClean="0"/>
-          </a:p>
-          <a:p>
-            <a:pPr lvl="1"/>
-            <a:r>
-              <a:rPr lang="en-US" dirty="0" err="1" smtClean="0"/>
-              <a:t>Smalt</a:t>
-            </a:r>
-            <a:r>
-              <a:rPr lang="en-US" dirty="0" smtClean="0"/>
-              <a:t>: http://</a:t>
-            </a:r>
-            <a:r>
-              <a:rPr lang="en-US" dirty="0" err="1" smtClean="0"/>
-              <a:t>www.sanger.ac.uk/resources/software/smalt</a:t>
-            </a:r>
-            <a:r>
-              <a:rPr lang="en-US" dirty="0" smtClean="0"/>
-              <a:t>/</a:t>
-            </a:r>
-          </a:p>
-          <a:p>
-            <a:pPr lvl="1"/>
-            <a:r>
-              <a:rPr lang="en-US" dirty="0" err="1" smtClean="0"/>
-              <a:t>Stampy</a:t>
-            </a:r>
-            <a:r>
-              <a:rPr lang="en-US" dirty="0" smtClean="0"/>
-              <a:t>: </a:t>
-            </a:r>
-            <a:r>
-              <a:rPr lang="en-US" dirty="0" err="1" smtClean="0"/>
-              <a:t>http://www.well.ox.ac.uk/project-stampy</a:t>
-            </a:r>
-            <a:endParaRPr lang="en-US" dirty="0" smtClean="0"/>
-          </a:p>
-          <a:p>
-            <a:r>
-              <a:rPr lang="en-US" dirty="0" smtClean="0"/>
-              <a:t>BAM Improvement</a:t>
-            </a:r>
-          </a:p>
-          <a:p>
-            <a:pPr lvl="1"/>
-            <a:r>
-              <a:rPr lang="en-US" dirty="0" smtClean="0"/>
-              <a:t>Realignment (GATK): </a:t>
-            </a:r>
-            <a:r>
-              <a:rPr lang="en-US" dirty="0" err="1" smtClean="0"/>
-              <a:t>http://www.broadinstitute.org/gsa/wiki/index.php/Local_realignment_around_indels</a:t>
-            </a:r>
-            <a:endParaRPr lang="en-US" dirty="0" smtClean="0"/>
-          </a:p>
-          <a:p>
-            <a:pPr lvl="1"/>
-            <a:r>
-              <a:rPr lang="en-US" dirty="0" smtClean="0"/>
-              <a:t>Recalibration: </a:t>
-            </a:r>
-            <a:r>
-              <a:rPr lang="en-US" dirty="0" err="1" smtClean="0"/>
-              <a:t>http://www.broadinstitute.org/gsa/wiki/index.php/Variant_quality_score_recalibration</a:t>
-            </a:r>
-            <a:endParaRPr lang="en-US" dirty="0" smtClean="0"/>
-          </a:p>
-          <a:p>
-            <a:r>
-              <a:rPr lang="en-US" dirty="0" smtClean="0"/>
-              <a:t>Library Merging</a:t>
-            </a:r>
-          </a:p>
-          <a:p>
-            <a:pPr lvl="1"/>
-            <a:r>
-              <a:rPr lang="en-US" dirty="0" smtClean="0"/>
-              <a:t>BAM Merging (Picard): </a:t>
-            </a:r>
-            <a:r>
-              <a:rPr lang="en-US" dirty="0" err="1" smtClean="0"/>
-              <a:t>http://picard.sourceforge.net/command-line-overview.shtml#MergeSamFiles</a:t>
-            </a:r>
-            <a:endParaRPr lang="en-US" dirty="0" smtClean="0"/>
-          </a:p>
-          <a:p>
-            <a:pPr lvl="1"/>
-            <a:r>
-              <a:rPr lang="en-US" dirty="0" smtClean="0"/>
-              <a:t>Duplicate Marking/removal (Picard): </a:t>
-            </a:r>
-            <a:r>
-              <a:rPr lang="en-US" dirty="0" err="1" smtClean="0"/>
-              <a:t>http://picard.sourceforge.net/command-line-overview.shtml#MarkDuplicates</a:t>
-            </a:r>
-            <a:endParaRPr lang="en-US" dirty="0"/>
           </a:p>
         </p:txBody>
       </p:sp>

</xml_diff>

<commit_message>
Removes dates from lecture slides.
</commit_message>
<xml_diff>
--- a/lectures/EBI_NGS_rsvc_slides.pptx
+++ b/lectures/EBI_NGS_rsvc_slides.pptx
@@ -261,7 +261,7 @@
           <a:p>
             <a:fld id="{683B11D8-A7E4-EF43-B6E1-02D8D0F96BD3}" type="datetimeFigureOut">
               <a:rPr lang="en-US" smtClean="0"/>
-              <a:t>9/21/17</a:t>
+              <a:t>3/29/18</a:t>
             </a:fld>
             <a:endParaRPr lang="en-US"/>
           </a:p>
@@ -427,7 +427,7 @@
             <a:fld id="{62009DDE-F922-854C-BEFF-CE1DF0F32BA2}" type="datetimeFigureOut">
               <a:rPr lang="en-US" smtClean="0"/>
               <a:pPr/>
-              <a:t>9/21/17</a:t>
+              <a:t>3/29/18</a:t>
             </a:fld>
             <a:endParaRPr lang="en-US"/>
           </a:p>
@@ -4604,24 +4604,8 @@
               <a:t>Human Genetics </a:t>
             </a:r>
             <a:r>
-              <a:rPr lang="en-GB" sz="1000" dirty="0"/>
-              <a:t>Informatics	</a:t>
-            </a:r>
-            <a:r>
               <a:rPr lang="en-GB" sz="1000" dirty="0" smtClean="0"/>
-              <a:t>9</a:t>
-            </a:r>
-            <a:r>
-              <a:rPr lang="en-GB" sz="1000" baseline="30000" dirty="0" smtClean="0"/>
-              <a:t>th</a:t>
-            </a:r>
-            <a:r>
-              <a:rPr lang="en-GB" sz="1000" dirty="0" smtClean="0"/>
-              <a:t> </a:t>
-            </a:r>
-            <a:r>
-              <a:rPr lang="en-GB" sz="1000" dirty="0" smtClean="0"/>
-              <a:t>April 2017</a:t>
+              <a:t>Informatics</a:t>
             </a:r>
             <a:endParaRPr lang="en-GB" sz="1000" dirty="0"/>
           </a:p>
@@ -5213,11 +5197,7 @@
             <a:pPr algn="l"/>
             <a:r>
               <a:rPr lang="en-US" dirty="0" smtClean="0"/>
-              <a:t>Human </a:t>
-            </a:r>
-            <a:r>
-              <a:rPr lang="en-US" dirty="0" smtClean="0"/>
-              <a:t>Genetics Informatics</a:t>
+              <a:t>Human Genetics Informatics</a:t>
             </a:r>
           </a:p>
           <a:p>
@@ -13144,14 +13124,14 @@
           </a:ln>
           <a:extLst>
             <a:ext uri="{909E8E84-426E-40dd-AFC4-6F175D3DCCD1}">
-              <a14:hiddenFill xmlns="" xmlns:a14="http://schemas.microsoft.com/office/drawing/2010/main">
+              <a14:hiddenFill xmlns:a14="http://schemas.microsoft.com/office/drawing/2010/main" xmlns="">
                 <a:solidFill>
                   <a:srgbClr val="FFFFFF"/>
                 </a:solidFill>
               </a14:hiddenFill>
             </a:ext>
             <a:ext uri="{91240B29-F687-4f45-9708-019B960494DF}">
-              <a14:hiddenLine xmlns="" xmlns:a14="http://schemas.microsoft.com/office/drawing/2010/main" w="9525">
+              <a14:hiddenLine xmlns:a14="http://schemas.microsoft.com/office/drawing/2010/main" xmlns="" w="9525">
                 <a:solidFill>
                   <a:srgbClr val="000000"/>
                 </a:solidFill>
@@ -13198,14 +13178,14 @@
           </a:ln>
           <a:extLst>
             <a:ext uri="{909E8E84-426E-40dd-AFC4-6F175D3DCCD1}">
-              <a14:hiddenFill xmlns="" xmlns:a14="http://schemas.microsoft.com/office/drawing/2010/main">
+              <a14:hiddenFill xmlns:a14="http://schemas.microsoft.com/office/drawing/2010/main" xmlns="">
                 <a:solidFill>
                   <a:srgbClr val="FFFFFF"/>
                 </a:solidFill>
               </a14:hiddenFill>
             </a:ext>
             <a:ext uri="{91240B29-F687-4f45-9708-019B960494DF}">
-              <a14:hiddenLine xmlns="" xmlns:a14="http://schemas.microsoft.com/office/drawing/2010/main" w="9525">
+              <a14:hiddenLine xmlns:a14="http://schemas.microsoft.com/office/drawing/2010/main" xmlns="" w="9525">
                 <a:solidFill>
                   <a:srgbClr val="000000"/>
                 </a:solidFill>
@@ -13252,14 +13232,14 @@
           </a:ln>
           <a:extLst>
             <a:ext uri="{909E8E84-426E-40dd-AFC4-6F175D3DCCD1}">
-              <a14:hiddenFill xmlns="" xmlns:a14="http://schemas.microsoft.com/office/drawing/2010/main">
+              <a14:hiddenFill xmlns:a14="http://schemas.microsoft.com/office/drawing/2010/main" xmlns="">
                 <a:solidFill>
                   <a:srgbClr val="FFFFFF"/>
                 </a:solidFill>
               </a14:hiddenFill>
             </a:ext>
             <a:ext uri="{91240B29-F687-4f45-9708-019B960494DF}">
-              <a14:hiddenLine xmlns="" xmlns:a14="http://schemas.microsoft.com/office/drawing/2010/main" w="9525">
+              <a14:hiddenLine xmlns:a14="http://schemas.microsoft.com/office/drawing/2010/main" xmlns="" w="9525">
                 <a:solidFill>
                   <a:srgbClr val="000000"/>
                 </a:solidFill>
@@ -13306,14 +13286,14 @@
           </a:ln>
           <a:extLst>
             <a:ext uri="{909E8E84-426E-40dd-AFC4-6F175D3DCCD1}">
-              <a14:hiddenFill xmlns="" xmlns:a14="http://schemas.microsoft.com/office/drawing/2010/main">
+              <a14:hiddenFill xmlns:a14="http://schemas.microsoft.com/office/drawing/2010/main" xmlns="">
                 <a:solidFill>
                   <a:srgbClr val="FFFFFF"/>
                 </a:solidFill>
               </a14:hiddenFill>
             </a:ext>
             <a:ext uri="{91240B29-F687-4f45-9708-019B960494DF}">
-              <a14:hiddenLine xmlns="" xmlns:a14="http://schemas.microsoft.com/office/drawing/2010/main" w="9525">
+              <a14:hiddenLine xmlns:a14="http://schemas.microsoft.com/office/drawing/2010/main" xmlns="" w="9525">
                 <a:solidFill>
                   <a:srgbClr val="000000"/>
                 </a:solidFill>
@@ -13366,14 +13346,14 @@
           </a:scene3d>
           <a:extLst>
             <a:ext uri="{909E8E84-426E-40dd-AFC4-6F175D3DCCD1}">
-              <a14:hiddenFill xmlns="" xmlns:a14="http://schemas.microsoft.com/office/drawing/2010/main">
+              <a14:hiddenFill xmlns:a14="http://schemas.microsoft.com/office/drawing/2010/main" xmlns="">
                 <a:solidFill>
                   <a:srgbClr val="FFFFFF"/>
                 </a:solidFill>
               </a14:hiddenFill>
             </a:ext>
             <a:ext uri="{91240B29-F687-4f45-9708-019B960494DF}">
-              <a14:hiddenLine xmlns="" xmlns:a14="http://schemas.microsoft.com/office/drawing/2010/main" w="9525">
+              <a14:hiddenLine xmlns:a14="http://schemas.microsoft.com/office/drawing/2010/main" xmlns="" w="9525">
                 <a:solidFill>
                   <a:srgbClr val="000000"/>
                 </a:solidFill>
@@ -16280,14 +16260,14 @@
           </a:ln>
           <a:extLst>
             <a:ext uri="{909E8E84-426E-40dd-AFC4-6F175D3DCCD1}">
-              <a14:hiddenFill xmlns="" xmlns:a14="http://schemas.microsoft.com/office/drawing/2010/main">
+              <a14:hiddenFill xmlns:a14="http://schemas.microsoft.com/office/drawing/2010/main" xmlns="">
                 <a:solidFill>
                   <a:srgbClr val="FFFFFF"/>
                 </a:solidFill>
               </a14:hiddenFill>
             </a:ext>
             <a:ext uri="{91240B29-F687-4f45-9708-019B960494DF}">
-              <a14:hiddenLine xmlns="" xmlns:a14="http://schemas.microsoft.com/office/drawing/2010/main" w="9525">
+              <a14:hiddenLine xmlns:a14="http://schemas.microsoft.com/office/drawing/2010/main" xmlns="" w="9525">
                 <a:solidFill>
                   <a:srgbClr val="000000"/>
                 </a:solidFill>
@@ -16334,14 +16314,14 @@
           </a:ln>
           <a:extLst>
             <a:ext uri="{909E8E84-426E-40dd-AFC4-6F175D3DCCD1}">
-              <a14:hiddenFill xmlns="" xmlns:a14="http://schemas.microsoft.com/office/drawing/2010/main">
+              <a14:hiddenFill xmlns:a14="http://schemas.microsoft.com/office/drawing/2010/main" xmlns="">
                 <a:solidFill>
                   <a:srgbClr val="FFFFFF"/>
                 </a:solidFill>
               </a14:hiddenFill>
             </a:ext>
             <a:ext uri="{91240B29-F687-4f45-9708-019B960494DF}">
-              <a14:hiddenLine xmlns="" xmlns:a14="http://schemas.microsoft.com/office/drawing/2010/main" w="9525">
+              <a14:hiddenLine xmlns:a14="http://schemas.microsoft.com/office/drawing/2010/main" xmlns="" w="9525">
                 <a:solidFill>
                   <a:srgbClr val="000000"/>
                 </a:solidFill>
@@ -16388,14 +16368,14 @@
           </a:ln>
           <a:extLst>
             <a:ext uri="{909E8E84-426E-40dd-AFC4-6F175D3DCCD1}">
-              <a14:hiddenFill xmlns="" xmlns:a14="http://schemas.microsoft.com/office/drawing/2010/main">
+              <a14:hiddenFill xmlns:a14="http://schemas.microsoft.com/office/drawing/2010/main" xmlns="">
                 <a:solidFill>
                   <a:srgbClr val="FFFFFF"/>
                 </a:solidFill>
               </a14:hiddenFill>
             </a:ext>
             <a:ext uri="{91240B29-F687-4f45-9708-019B960494DF}">
-              <a14:hiddenLine xmlns="" xmlns:a14="http://schemas.microsoft.com/office/drawing/2010/main" w="9525">
+              <a14:hiddenLine xmlns:a14="http://schemas.microsoft.com/office/drawing/2010/main" xmlns="" w="9525">
                 <a:solidFill>
                   <a:srgbClr val="000000"/>
                 </a:solidFill>
@@ -16442,14 +16422,14 @@
           </a:ln>
           <a:extLst>
             <a:ext uri="{909E8E84-426E-40dd-AFC4-6F175D3DCCD1}">
-              <a14:hiddenFill xmlns="" xmlns:a14="http://schemas.microsoft.com/office/drawing/2010/main">
+              <a14:hiddenFill xmlns:a14="http://schemas.microsoft.com/office/drawing/2010/main" xmlns="">
                 <a:solidFill>
                   <a:srgbClr val="FFFFFF"/>
                 </a:solidFill>
               </a14:hiddenFill>
             </a:ext>
             <a:ext uri="{91240B29-F687-4f45-9708-019B960494DF}">
-              <a14:hiddenLine xmlns="" xmlns:a14="http://schemas.microsoft.com/office/drawing/2010/main" w="9525">
+              <a14:hiddenLine xmlns:a14="http://schemas.microsoft.com/office/drawing/2010/main" xmlns="" w="9525">
                 <a:solidFill>
                   <a:srgbClr val="000000"/>
                 </a:solidFill>
@@ -16502,14 +16482,14 @@
           </a:scene3d>
           <a:extLst>
             <a:ext uri="{909E8E84-426E-40dd-AFC4-6F175D3DCCD1}">
-              <a14:hiddenFill xmlns="" xmlns:a14="http://schemas.microsoft.com/office/drawing/2010/main">
+              <a14:hiddenFill xmlns:a14="http://schemas.microsoft.com/office/drawing/2010/main" xmlns="">
                 <a:solidFill>
                   <a:srgbClr val="FFFFFF"/>
                 </a:solidFill>
               </a14:hiddenFill>
             </a:ext>
             <a:ext uri="{91240B29-F687-4f45-9708-019B960494DF}">
-              <a14:hiddenLine xmlns="" xmlns:a14="http://schemas.microsoft.com/office/drawing/2010/main" w="9525">
+              <a14:hiddenLine xmlns:a14="http://schemas.microsoft.com/office/drawing/2010/main" xmlns="" w="9525">
                 <a:solidFill>
                   <a:srgbClr val="000000"/>
                 </a:solidFill>
@@ -20638,14 +20618,14 @@
           </a:ln>
           <a:extLst>
             <a:ext uri="{909E8E84-426E-40dd-AFC4-6F175D3DCCD1}">
-              <a14:hiddenFill xmlns="" xmlns:a14="http://schemas.microsoft.com/office/drawing/2010/main">
+              <a14:hiddenFill xmlns:a14="http://schemas.microsoft.com/office/drawing/2010/main" xmlns="">
                 <a:solidFill>
                   <a:srgbClr val="FFFFFF"/>
                 </a:solidFill>
               </a14:hiddenFill>
             </a:ext>
             <a:ext uri="{91240B29-F687-4f45-9708-019B960494DF}">
-              <a14:hiddenLine xmlns="" xmlns:a14="http://schemas.microsoft.com/office/drawing/2010/main" w="9525">
+              <a14:hiddenLine xmlns:a14="http://schemas.microsoft.com/office/drawing/2010/main" xmlns="" w="9525">
                 <a:solidFill>
                   <a:srgbClr val="000000"/>
                 </a:solidFill>
@@ -20692,14 +20672,14 @@
           </a:ln>
           <a:extLst>
             <a:ext uri="{909E8E84-426E-40dd-AFC4-6F175D3DCCD1}">
-              <a14:hiddenFill xmlns="" xmlns:a14="http://schemas.microsoft.com/office/drawing/2010/main">
+              <a14:hiddenFill xmlns:a14="http://schemas.microsoft.com/office/drawing/2010/main" xmlns="">
                 <a:solidFill>
                   <a:srgbClr val="FFFFFF"/>
                 </a:solidFill>
               </a14:hiddenFill>
             </a:ext>
             <a:ext uri="{91240B29-F687-4f45-9708-019B960494DF}">
-              <a14:hiddenLine xmlns="" xmlns:a14="http://schemas.microsoft.com/office/drawing/2010/main" w="9525">
+              <a14:hiddenLine xmlns:a14="http://schemas.microsoft.com/office/drawing/2010/main" xmlns="" w="9525">
                 <a:solidFill>
                   <a:srgbClr val="000000"/>
                 </a:solidFill>
@@ -20746,14 +20726,14 @@
           </a:ln>
           <a:extLst>
             <a:ext uri="{909E8E84-426E-40dd-AFC4-6F175D3DCCD1}">
-              <a14:hiddenFill xmlns="" xmlns:a14="http://schemas.microsoft.com/office/drawing/2010/main">
+              <a14:hiddenFill xmlns:a14="http://schemas.microsoft.com/office/drawing/2010/main" xmlns="">
                 <a:solidFill>
                   <a:srgbClr val="FFFFFF"/>
                 </a:solidFill>
               </a14:hiddenFill>
             </a:ext>
             <a:ext uri="{91240B29-F687-4f45-9708-019B960494DF}">
-              <a14:hiddenLine xmlns="" xmlns:a14="http://schemas.microsoft.com/office/drawing/2010/main" w="9525">
+              <a14:hiddenLine xmlns:a14="http://schemas.microsoft.com/office/drawing/2010/main" xmlns="" w="9525">
                 <a:solidFill>
                   <a:srgbClr val="000000"/>
                 </a:solidFill>
@@ -20800,14 +20780,14 @@
           </a:ln>
           <a:extLst>
             <a:ext uri="{909E8E84-426E-40dd-AFC4-6F175D3DCCD1}">
-              <a14:hiddenFill xmlns="" xmlns:a14="http://schemas.microsoft.com/office/drawing/2010/main">
+              <a14:hiddenFill xmlns:a14="http://schemas.microsoft.com/office/drawing/2010/main" xmlns="">
                 <a:solidFill>
                   <a:srgbClr val="FFFFFF"/>
                 </a:solidFill>
               </a14:hiddenFill>
             </a:ext>
             <a:ext uri="{91240B29-F687-4f45-9708-019B960494DF}">
-              <a14:hiddenLine xmlns="" xmlns:a14="http://schemas.microsoft.com/office/drawing/2010/main" w="9525">
+              <a14:hiddenLine xmlns:a14="http://schemas.microsoft.com/office/drawing/2010/main" xmlns="" w="9525">
                 <a:solidFill>
                   <a:srgbClr val="000000"/>
                 </a:solidFill>
@@ -20860,14 +20840,14 @@
           </a:scene3d>
           <a:extLst>
             <a:ext uri="{909E8E84-426E-40dd-AFC4-6F175D3DCCD1}">
-              <a14:hiddenFill xmlns="" xmlns:a14="http://schemas.microsoft.com/office/drawing/2010/main">
+              <a14:hiddenFill xmlns:a14="http://schemas.microsoft.com/office/drawing/2010/main" xmlns="">
                 <a:solidFill>
                   <a:srgbClr val="FFFFFF"/>
                 </a:solidFill>
               </a14:hiddenFill>
             </a:ext>
             <a:ext uri="{91240B29-F687-4f45-9708-019B960494DF}">
-              <a14:hiddenLine xmlns="" xmlns:a14="http://schemas.microsoft.com/office/drawing/2010/main" w="9525">
+              <a14:hiddenLine xmlns:a14="http://schemas.microsoft.com/office/drawing/2010/main" xmlns="" w="9525">
                 <a:solidFill>
                   <a:srgbClr val="000000"/>
                 </a:solidFill>

</xml_diff>

<commit_message>
Updated dead links in lecture slides.
</commit_message>
<xml_diff>
--- a/lectures/EBI_NGS_rsvc_slides.pptx
+++ b/lectures/EBI_NGS_rsvc_slides.pptx
@@ -175,6 +175,9 @@
         </p15:guide>
       </p15:sldGuideLst>
     </p:ext>
+    <p:ext uri="{2D200454-40CA-4A62-9FC3-DE9A4176ACB9}">
+      <p15:notesGuideLst xmlns:p15="http://schemas.microsoft.com/office/powerpoint/2012/main"/>
+    </p:ext>
   </p:extLst>
 </p:presentation>
 </file>
@@ -261,7 +264,7 @@
           <a:p>
             <a:fld id="{683B11D8-A7E4-EF43-B6E1-02D8D0F96BD3}" type="datetimeFigureOut">
               <a:rPr lang="en-US" smtClean="0"/>
-              <a:t>3/29/18</a:t>
+              <a:t>4/4/18</a:t>
             </a:fld>
             <a:endParaRPr lang="en-US"/>
           </a:p>
@@ -427,7 +430,7 @@
             <a:fld id="{62009DDE-F922-854C-BEFF-CE1DF0F32BA2}" type="datetimeFigureOut">
               <a:rPr lang="en-US" smtClean="0"/>
               <a:pPr/>
-              <a:t>3/29/18</a:t>
+              <a:t>4/4/18</a:t>
             </a:fld>
             <a:endParaRPr lang="en-US"/>
           </a:p>
@@ -4601,11 +4604,7 @@
             <a:pPr eaLnBrk="1" hangingPunct="1"/>
             <a:r>
               <a:rPr lang="en-GB" sz="1000" dirty="0" smtClean="0"/>
-              <a:t>Human Genetics </a:t>
-            </a:r>
-            <a:r>
-              <a:rPr lang="en-GB" sz="1000" dirty="0" smtClean="0"/>
-              <a:t>Informatics</a:t>
+              <a:t>Human Genetics Informatics</a:t>
             </a:r>
             <a:endParaRPr lang="en-GB" sz="1000" dirty="0"/>
           </a:p>
@@ -9587,36 +9586,69 @@
           </a:p>
           <a:p>
             <a:r>
-              <a:rPr lang="en-US" dirty="0" err="1" smtClean="0"/>
-              <a:t>Smalt</a:t>
-            </a:r>
-            <a:r>
-              <a:rPr lang="en-US" dirty="0" smtClean="0"/>
-              <a:t>: http://</a:t>
-            </a:r>
-            <a:r>
-              <a:rPr lang="en-US" dirty="0" err="1" smtClean="0"/>
-              <a:t>www.sanger.ac.uk/resources/software/smalt</a:t>
-            </a:r>
-            <a:r>
-              <a:rPr lang="en-US" dirty="0" smtClean="0"/>
+              <a:rPr lang="en-US" dirty="0" smtClean="0"/>
+              <a:t>Smalt: </a:t>
+            </a:r>
+            <a:r>
+              <a:rPr lang="en-US" dirty="0"/>
+              <a:t>http://</a:t>
+            </a:r>
+            <a:r>
+              <a:rPr lang="en-US" dirty="0" err="1"/>
+              <a:t>www.sanger.ac.uk</a:t>
+            </a:r>
+            <a:r>
+              <a:rPr lang="en-US" dirty="0"/>
+              <a:t>/science/tools/smalt-0</a:t>
+            </a:r>
+            <a:endParaRPr lang="en-US" dirty="0" smtClean="0"/>
+          </a:p>
+          <a:p>
+            <a:endParaRPr lang="en-US" dirty="0" smtClean="0"/>
+          </a:p>
+          <a:p>
+            <a:r>
+              <a:rPr lang="en-US" dirty="0" smtClean="0"/>
+              <a:t>Local </a:t>
+            </a:r>
+            <a:r>
+              <a:rPr lang="en-US" dirty="0" smtClean="0"/>
+              <a:t>realignment</a:t>
+            </a:r>
+          </a:p>
+          <a:p>
+            <a:pPr lvl="1"/>
+            <a:r>
+              <a:rPr lang="en-US" dirty="0"/>
+              <a:t>https://</a:t>
+            </a:r>
+            <a:r>
+              <a:rPr lang="en-US" dirty="0" err="1"/>
+              <a:t>software.broadinstitute.org</a:t>
+            </a:r>
+            <a:r>
+              <a:rPr lang="en-US" dirty="0"/>
               <a:t>/</a:t>
             </a:r>
-          </a:p>
-          <a:p>
-            <a:endParaRPr lang="en-US" dirty="0" smtClean="0"/>
-          </a:p>
-          <a:p>
-            <a:r>
-              <a:rPr lang="en-US" dirty="0" smtClean="0"/>
-              <a:t>Local realignment</a:t>
-            </a:r>
-          </a:p>
-          <a:p>
-            <a:pPr lvl="1"/>
-            <a:r>
-              <a:rPr lang="en-US" dirty="0" err="1" smtClean="0"/>
-              <a:t>http://www.broadinstitute.org/gsa/wiki/index.php/Local_realignment_around_indels</a:t>
+            <a:r>
+              <a:rPr lang="en-US" dirty="0" err="1"/>
+              <a:t>gatk</a:t>
+            </a:r>
+            <a:r>
+              <a:rPr lang="en-US" dirty="0"/>
+              <a:t>/documentation/</a:t>
+            </a:r>
+            <a:r>
+              <a:rPr lang="en-US" dirty="0" err="1"/>
+              <a:t>tooldocs</a:t>
+            </a:r>
+            <a:r>
+              <a:rPr lang="en-US" dirty="0"/>
+              <a:t>/3.8-0/</a:t>
+            </a:r>
+            <a:r>
+              <a:rPr lang="en-US" dirty="0" err="1"/>
+              <a:t>org_broadinstitute_gatk_tools_walkers_indels_IndelRealigner.php</a:t>
             </a:r>
             <a:endParaRPr lang="en-US" dirty="0" smtClean="0"/>
           </a:p>
@@ -13124,14 +13156,14 @@
           </a:ln>
           <a:extLst>
             <a:ext uri="{909E8E84-426E-40dd-AFC4-6F175D3DCCD1}">
-              <a14:hiddenFill xmlns:a14="http://schemas.microsoft.com/office/drawing/2010/main" xmlns="">
+              <a14:hiddenFill xmlns="" xmlns:a14="http://schemas.microsoft.com/office/drawing/2010/main">
                 <a:solidFill>
                   <a:srgbClr val="FFFFFF"/>
                 </a:solidFill>
               </a14:hiddenFill>
             </a:ext>
             <a:ext uri="{91240B29-F687-4f45-9708-019B960494DF}">
-              <a14:hiddenLine xmlns:a14="http://schemas.microsoft.com/office/drawing/2010/main" xmlns="" w="9525">
+              <a14:hiddenLine xmlns="" xmlns:a14="http://schemas.microsoft.com/office/drawing/2010/main" w="9525">
                 <a:solidFill>
                   <a:srgbClr val="000000"/>
                 </a:solidFill>
@@ -13178,14 +13210,14 @@
           </a:ln>
           <a:extLst>
             <a:ext uri="{909E8E84-426E-40dd-AFC4-6F175D3DCCD1}">
-              <a14:hiddenFill xmlns:a14="http://schemas.microsoft.com/office/drawing/2010/main" xmlns="">
+              <a14:hiddenFill xmlns="" xmlns:a14="http://schemas.microsoft.com/office/drawing/2010/main">
                 <a:solidFill>
                   <a:srgbClr val="FFFFFF"/>
                 </a:solidFill>
               </a14:hiddenFill>
             </a:ext>
             <a:ext uri="{91240B29-F687-4f45-9708-019B960494DF}">
-              <a14:hiddenLine xmlns:a14="http://schemas.microsoft.com/office/drawing/2010/main" xmlns="" w="9525">
+              <a14:hiddenLine xmlns="" xmlns:a14="http://schemas.microsoft.com/office/drawing/2010/main" w="9525">
                 <a:solidFill>
                   <a:srgbClr val="000000"/>
                 </a:solidFill>
@@ -13232,14 +13264,14 @@
           </a:ln>
           <a:extLst>
             <a:ext uri="{909E8E84-426E-40dd-AFC4-6F175D3DCCD1}">
-              <a14:hiddenFill xmlns:a14="http://schemas.microsoft.com/office/drawing/2010/main" xmlns="">
+              <a14:hiddenFill xmlns="" xmlns:a14="http://schemas.microsoft.com/office/drawing/2010/main">
                 <a:solidFill>
                   <a:srgbClr val="FFFFFF"/>
                 </a:solidFill>
               </a14:hiddenFill>
             </a:ext>
             <a:ext uri="{91240B29-F687-4f45-9708-019B960494DF}">
-              <a14:hiddenLine xmlns:a14="http://schemas.microsoft.com/office/drawing/2010/main" xmlns="" w="9525">
+              <a14:hiddenLine xmlns="" xmlns:a14="http://schemas.microsoft.com/office/drawing/2010/main" w="9525">
                 <a:solidFill>
                   <a:srgbClr val="000000"/>
                 </a:solidFill>
@@ -13286,14 +13318,14 @@
           </a:ln>
           <a:extLst>
             <a:ext uri="{909E8E84-426E-40dd-AFC4-6F175D3DCCD1}">
-              <a14:hiddenFill xmlns:a14="http://schemas.microsoft.com/office/drawing/2010/main" xmlns="">
+              <a14:hiddenFill xmlns="" xmlns:a14="http://schemas.microsoft.com/office/drawing/2010/main">
                 <a:solidFill>
                   <a:srgbClr val="FFFFFF"/>
                 </a:solidFill>
               </a14:hiddenFill>
             </a:ext>
             <a:ext uri="{91240B29-F687-4f45-9708-019B960494DF}">
-              <a14:hiddenLine xmlns:a14="http://schemas.microsoft.com/office/drawing/2010/main" xmlns="" w="9525">
+              <a14:hiddenLine xmlns="" xmlns:a14="http://schemas.microsoft.com/office/drawing/2010/main" w="9525">
                 <a:solidFill>
                   <a:srgbClr val="000000"/>
                 </a:solidFill>
@@ -13346,14 +13378,14 @@
           </a:scene3d>
           <a:extLst>
             <a:ext uri="{909E8E84-426E-40dd-AFC4-6F175D3DCCD1}">
-              <a14:hiddenFill xmlns:a14="http://schemas.microsoft.com/office/drawing/2010/main" xmlns="">
+              <a14:hiddenFill xmlns="" xmlns:a14="http://schemas.microsoft.com/office/drawing/2010/main">
                 <a:solidFill>
                   <a:srgbClr val="FFFFFF"/>
                 </a:solidFill>
               </a14:hiddenFill>
             </a:ext>
             <a:ext uri="{91240B29-F687-4f45-9708-019B960494DF}">
-              <a14:hiddenLine xmlns:a14="http://schemas.microsoft.com/office/drawing/2010/main" xmlns="" w="9525">
+              <a14:hiddenLine xmlns="" xmlns:a14="http://schemas.microsoft.com/office/drawing/2010/main" w="9525">
                 <a:solidFill>
                   <a:srgbClr val="000000"/>
                 </a:solidFill>
@@ -16260,14 +16292,14 @@
           </a:ln>
           <a:extLst>
             <a:ext uri="{909E8E84-426E-40dd-AFC4-6F175D3DCCD1}">
-              <a14:hiddenFill xmlns:a14="http://schemas.microsoft.com/office/drawing/2010/main" xmlns="">
+              <a14:hiddenFill xmlns="" xmlns:a14="http://schemas.microsoft.com/office/drawing/2010/main">
                 <a:solidFill>
                   <a:srgbClr val="FFFFFF"/>
                 </a:solidFill>
               </a14:hiddenFill>
             </a:ext>
             <a:ext uri="{91240B29-F687-4f45-9708-019B960494DF}">
-              <a14:hiddenLine xmlns:a14="http://schemas.microsoft.com/office/drawing/2010/main" xmlns="" w="9525">
+              <a14:hiddenLine xmlns="" xmlns:a14="http://schemas.microsoft.com/office/drawing/2010/main" w="9525">
                 <a:solidFill>
                   <a:srgbClr val="000000"/>
                 </a:solidFill>
@@ -16314,14 +16346,14 @@
           </a:ln>
           <a:extLst>
             <a:ext uri="{909E8E84-426E-40dd-AFC4-6F175D3DCCD1}">
-              <a14:hiddenFill xmlns:a14="http://schemas.microsoft.com/office/drawing/2010/main" xmlns="">
+              <a14:hiddenFill xmlns="" xmlns:a14="http://schemas.microsoft.com/office/drawing/2010/main">
                 <a:solidFill>
                   <a:srgbClr val="FFFFFF"/>
                 </a:solidFill>
               </a14:hiddenFill>
             </a:ext>
             <a:ext uri="{91240B29-F687-4f45-9708-019B960494DF}">
-              <a14:hiddenLine xmlns:a14="http://schemas.microsoft.com/office/drawing/2010/main" xmlns="" w="9525">
+              <a14:hiddenLine xmlns="" xmlns:a14="http://schemas.microsoft.com/office/drawing/2010/main" w="9525">
                 <a:solidFill>
                   <a:srgbClr val="000000"/>
                 </a:solidFill>
@@ -16368,14 +16400,14 @@
           </a:ln>
           <a:extLst>
             <a:ext uri="{909E8E84-426E-40dd-AFC4-6F175D3DCCD1}">
-              <a14:hiddenFill xmlns:a14="http://schemas.microsoft.com/office/drawing/2010/main" xmlns="">
+              <a14:hiddenFill xmlns="" xmlns:a14="http://schemas.microsoft.com/office/drawing/2010/main">
                 <a:solidFill>
                   <a:srgbClr val="FFFFFF"/>
                 </a:solidFill>
               </a14:hiddenFill>
             </a:ext>
             <a:ext uri="{91240B29-F687-4f45-9708-019B960494DF}">
-              <a14:hiddenLine xmlns:a14="http://schemas.microsoft.com/office/drawing/2010/main" xmlns="" w="9525">
+              <a14:hiddenLine xmlns="" xmlns:a14="http://schemas.microsoft.com/office/drawing/2010/main" w="9525">
                 <a:solidFill>
                   <a:srgbClr val="000000"/>
                 </a:solidFill>
@@ -16422,14 +16454,14 @@
           </a:ln>
           <a:extLst>
             <a:ext uri="{909E8E84-426E-40dd-AFC4-6F175D3DCCD1}">
-              <a14:hiddenFill xmlns:a14="http://schemas.microsoft.com/office/drawing/2010/main" xmlns="">
+              <a14:hiddenFill xmlns="" xmlns:a14="http://schemas.microsoft.com/office/drawing/2010/main">
                 <a:solidFill>
                   <a:srgbClr val="FFFFFF"/>
                 </a:solidFill>
               </a14:hiddenFill>
             </a:ext>
             <a:ext uri="{91240B29-F687-4f45-9708-019B960494DF}">
-              <a14:hiddenLine xmlns:a14="http://schemas.microsoft.com/office/drawing/2010/main" xmlns="" w="9525">
+              <a14:hiddenLine xmlns="" xmlns:a14="http://schemas.microsoft.com/office/drawing/2010/main" w="9525">
                 <a:solidFill>
                   <a:srgbClr val="000000"/>
                 </a:solidFill>
@@ -16482,14 +16514,14 @@
           </a:scene3d>
           <a:extLst>
             <a:ext uri="{909E8E84-426E-40dd-AFC4-6F175D3DCCD1}">
-              <a14:hiddenFill xmlns:a14="http://schemas.microsoft.com/office/drawing/2010/main" xmlns="">
+              <a14:hiddenFill xmlns="" xmlns:a14="http://schemas.microsoft.com/office/drawing/2010/main">
                 <a:solidFill>
                   <a:srgbClr val="FFFFFF"/>
                 </a:solidFill>
               </a14:hiddenFill>
             </a:ext>
             <a:ext uri="{91240B29-F687-4f45-9708-019B960494DF}">
-              <a14:hiddenLine xmlns:a14="http://schemas.microsoft.com/office/drawing/2010/main" xmlns="" w="9525">
+              <a14:hiddenLine xmlns="" xmlns:a14="http://schemas.microsoft.com/office/drawing/2010/main" w="9525">
                 <a:solidFill>
                   <a:srgbClr val="000000"/>
                 </a:solidFill>
@@ -20618,14 +20650,14 @@
           </a:ln>
           <a:extLst>
             <a:ext uri="{909E8E84-426E-40dd-AFC4-6F175D3DCCD1}">
-              <a14:hiddenFill xmlns:a14="http://schemas.microsoft.com/office/drawing/2010/main" xmlns="">
+              <a14:hiddenFill xmlns="" xmlns:a14="http://schemas.microsoft.com/office/drawing/2010/main">
                 <a:solidFill>
                   <a:srgbClr val="FFFFFF"/>
                 </a:solidFill>
               </a14:hiddenFill>
             </a:ext>
             <a:ext uri="{91240B29-F687-4f45-9708-019B960494DF}">
-              <a14:hiddenLine xmlns:a14="http://schemas.microsoft.com/office/drawing/2010/main" xmlns="" w="9525">
+              <a14:hiddenLine xmlns="" xmlns:a14="http://schemas.microsoft.com/office/drawing/2010/main" w="9525">
                 <a:solidFill>
                   <a:srgbClr val="000000"/>
                 </a:solidFill>
@@ -20672,14 +20704,14 @@
           </a:ln>
           <a:extLst>
             <a:ext uri="{909E8E84-426E-40dd-AFC4-6F175D3DCCD1}">
-              <a14:hiddenFill xmlns:a14="http://schemas.microsoft.com/office/drawing/2010/main" xmlns="">
+              <a14:hiddenFill xmlns="" xmlns:a14="http://schemas.microsoft.com/office/drawing/2010/main">
                 <a:solidFill>
                   <a:srgbClr val="FFFFFF"/>
                 </a:solidFill>
               </a14:hiddenFill>
             </a:ext>
             <a:ext uri="{91240B29-F687-4f45-9708-019B960494DF}">
-              <a14:hiddenLine xmlns:a14="http://schemas.microsoft.com/office/drawing/2010/main" xmlns="" w="9525">
+              <a14:hiddenLine xmlns="" xmlns:a14="http://schemas.microsoft.com/office/drawing/2010/main" w="9525">
                 <a:solidFill>
                   <a:srgbClr val="000000"/>
                 </a:solidFill>
@@ -20726,14 +20758,14 @@
           </a:ln>
           <a:extLst>
             <a:ext uri="{909E8E84-426E-40dd-AFC4-6F175D3DCCD1}">
-              <a14:hiddenFill xmlns:a14="http://schemas.microsoft.com/office/drawing/2010/main" xmlns="">
+              <a14:hiddenFill xmlns="" xmlns:a14="http://schemas.microsoft.com/office/drawing/2010/main">
                 <a:solidFill>
                   <a:srgbClr val="FFFFFF"/>
                 </a:solidFill>
               </a14:hiddenFill>
             </a:ext>
             <a:ext uri="{91240B29-F687-4f45-9708-019B960494DF}">
-              <a14:hiddenLine xmlns:a14="http://schemas.microsoft.com/office/drawing/2010/main" xmlns="" w="9525">
+              <a14:hiddenLine xmlns="" xmlns:a14="http://schemas.microsoft.com/office/drawing/2010/main" w="9525">
                 <a:solidFill>
                   <a:srgbClr val="000000"/>
                 </a:solidFill>
@@ -20780,14 +20812,14 @@
           </a:ln>
           <a:extLst>
             <a:ext uri="{909E8E84-426E-40dd-AFC4-6F175D3DCCD1}">
-              <a14:hiddenFill xmlns:a14="http://schemas.microsoft.com/office/drawing/2010/main" xmlns="">
+              <a14:hiddenFill xmlns="" xmlns:a14="http://schemas.microsoft.com/office/drawing/2010/main">
                 <a:solidFill>
                   <a:srgbClr val="FFFFFF"/>
                 </a:solidFill>
               </a14:hiddenFill>
             </a:ext>
             <a:ext uri="{91240B29-F687-4f45-9708-019B960494DF}">
-              <a14:hiddenLine xmlns:a14="http://schemas.microsoft.com/office/drawing/2010/main" xmlns="" w="9525">
+              <a14:hiddenLine xmlns="" xmlns:a14="http://schemas.microsoft.com/office/drawing/2010/main" w="9525">
                 <a:solidFill>
                   <a:srgbClr val="000000"/>
                 </a:solidFill>
@@ -20840,14 +20872,14 @@
           </a:scene3d>
           <a:extLst>
             <a:ext uri="{909E8E84-426E-40dd-AFC4-6F175D3DCCD1}">
-              <a14:hiddenFill xmlns:a14="http://schemas.microsoft.com/office/drawing/2010/main" xmlns="">
+              <a14:hiddenFill xmlns="" xmlns:a14="http://schemas.microsoft.com/office/drawing/2010/main">
                 <a:solidFill>
                   <a:srgbClr val="FFFFFF"/>
                 </a:solidFill>
               </a14:hiddenFill>
             </a:ext>
             <a:ext uri="{91240B29-F687-4f45-9708-019B960494DF}">
-              <a14:hiddenLine xmlns:a14="http://schemas.microsoft.com/office/drawing/2010/main" xmlns="" w="9525">
+              <a14:hiddenLine xmlns="" xmlns:a14="http://schemas.microsoft.com/office/drawing/2010/main" w="9525">
                 <a:solidFill>
                   <a:srgbClr val="000000"/>
                 </a:solidFill>
@@ -21865,7 +21897,15 @@
             <a:pPr lvl="1"/>
             <a:r>
               <a:rPr lang="en-US" sz="1600" dirty="0" smtClean="0"/>
-              <a:t>Realignment (GATK):</a:t>
+              <a:t>Realignment (GATK</a:t>
+            </a:r>
+            <a:r>
+              <a:rPr lang="en-US" sz="1600" dirty="0" smtClean="0"/>
+              <a:t>):</a:t>
+            </a:r>
+            <a:r>
+              <a:rPr lang="en-US" sz="1600" dirty="0" smtClean="0"/>
+              <a:t/>
             </a:r>
             <a:br>
               <a:rPr lang="en-US" sz="1600" dirty="0" smtClean="0"/>
@@ -21891,19 +21931,7 @@
               <a:rPr lang="en-US" sz="1600" dirty="0" smtClean="0">
                 <a:hlinkClick r:id="rId6"/>
               </a:rPr>
-              <a:t>https</a:t>
-            </a:r>
-            <a:r>
-              <a:rPr lang="en-US" sz="1600" dirty="0">
-                <a:hlinkClick r:id="rId6"/>
-              </a:rPr>
-              <a:t>://</a:t>
-            </a:r>
-            <a:r>
-              <a:rPr lang="en-US" sz="1600" dirty="0" smtClean="0">
-                <a:hlinkClick r:id="rId6"/>
-              </a:rPr>
-              <a:t>software.broadinstitute.org/gatk/documentation/tooldocs/current/org_broadinstitute_gatk_tools_walkers_variantrecalibration_VariantRecalibrator.php</a:t>
+              <a:t>https://software.broadinstitute.org/gatk/documentation/tooldocs/current/org_broadinstitute_gatk_tools_walkers_variantrecalibration_VariantRecalibrator.php</a:t>
             </a:r>
             <a:endParaRPr lang="en-US" sz="1600" dirty="0" smtClean="0"/>
           </a:p>
@@ -21911,7 +21939,11 @@
             <a:pPr lvl="1"/>
             <a:r>
               <a:rPr lang="en-US" sz="1600" dirty="0" smtClean="0"/>
-              <a:t>Library Merging</a:t>
+              <a:t>Library </a:t>
+            </a:r>
+            <a:r>
+              <a:rPr lang="en-US" sz="1600" dirty="0" smtClean="0"/>
+              <a:t>Merging</a:t>
             </a:r>
           </a:p>
           <a:p>

</xml_diff>

<commit_message>
`bwa aln` -> `bwa mem`
</commit_message>
<xml_diff>
--- a/lectures/EBI_NGS_rsvc_slides.pptx
+++ b/lectures/EBI_NGS_rsvc_slides.pptx
@@ -7737,7 +7737,7 @@
         <p:spPr/>
         <p:txBody>
           <a:bodyPr>
-            <a:normAutofit lnSpcReduction="10000"/>
+            <a:normAutofit/>
           </a:bodyPr>
           <a:lstStyle/>
           <a:p>
@@ -7793,8 +7793,16 @@
             </a:r>
             <a:r>
               <a:rPr lang="en-US" dirty="0" smtClean="0"/>
-              <a:t> for human size genome, is for smaller genomes (div deprecated)</a:t>
-            </a:r>
+              <a:t> for human size genome, is for smaller genomes (div deprecated</a:t>
+            </a:r>
+            <a:r>
+              <a:rPr lang="en-US" dirty="0" smtClean="0"/>
+              <a:t>)</a:t>
+            </a:r>
+          </a:p>
+          <a:p>
+            <a:pPr lvl="1"/>
+            <a:endParaRPr lang="en-US" dirty="0" smtClean="0"/>
           </a:p>
           <a:p>
             <a:r>
@@ -7809,21 +7817,21 @@
                 <a:latin typeface="Courier"/>
                 <a:cs typeface="Courier"/>
               </a:rPr>
-              <a:t> </a:t>
+              <a:t> mem [options] &lt;</a:t>
             </a:r>
             <a:r>
               <a:rPr lang="en-US" dirty="0" err="1" smtClean="0">
                 <a:latin typeface="Courier"/>
                 <a:cs typeface="Courier"/>
               </a:rPr>
-              <a:t>aln</a:t>
+              <a:t>idxbase</a:t>
             </a:r>
             <a:r>
               <a:rPr lang="en-US" dirty="0" smtClean="0">
                 <a:latin typeface="Courier"/>
                 <a:cs typeface="Courier"/>
               </a:rPr>
-              <a:t> [options] &lt;prefix&gt; &lt;</a:t>
+              <a:t>&gt; &lt;</a:t>
             </a:r>
             <a:r>
               <a:rPr lang="en-US" dirty="0" err="1" smtClean="0">
@@ -7837,166 +7845,38 @@
                 <a:latin typeface="Courier"/>
                 <a:cs typeface="Courier"/>
               </a:rPr>
-              <a:t>&gt;</a:t>
+              <a:t>&gt; [in2.fa]</a:t>
             </a:r>
           </a:p>
           <a:p>
             <a:pPr lvl="1"/>
             <a:r>
               <a:rPr lang="en-US" dirty="0" smtClean="0"/>
-              <a:t>Align each single end </a:t>
-            </a:r>
-            <a:r>
-              <a:rPr lang="en-US" dirty="0" err="1" smtClean="0"/>
-              <a:t>fastq</a:t>
-            </a:r>
-            <a:r>
-              <a:rPr lang="en-US" dirty="0" smtClean="0"/>
-              <a:t> file individually</a:t>
+              <a:t>Various </a:t>
+            </a:r>
+            <a:r>
+              <a:rPr lang="en-US" dirty="0" smtClean="0"/>
+              <a:t>options to change the alignment parameters/scoring matrix/seed length</a:t>
             </a:r>
           </a:p>
           <a:p>
             <a:pPr lvl="1"/>
             <a:r>
               <a:rPr lang="en-US" dirty="0" smtClean="0"/>
-              <a:t>Various options to change the alignment parameters/scoring matrix/seed length</a:t>
-            </a:r>
-          </a:p>
-          <a:p>
-            <a:r>
-              <a:rPr lang="en-US" dirty="0" err="1" smtClean="0">
-                <a:latin typeface="Courier"/>
-                <a:cs typeface="Courier"/>
-              </a:rPr>
-              <a:t>bwa</a:t>
-            </a:r>
-            <a:r>
-              <a:rPr lang="en-US" dirty="0" smtClean="0">
-                <a:latin typeface="Courier"/>
-                <a:cs typeface="Courier"/>
-              </a:rPr>
-              <a:t> </a:t>
-            </a:r>
-            <a:r>
-              <a:rPr lang="en-US" dirty="0" err="1" smtClean="0">
-                <a:latin typeface="Courier"/>
-                <a:cs typeface="Courier"/>
-              </a:rPr>
-              <a:t>sampe</a:t>
-            </a:r>
-            <a:r>
-              <a:rPr lang="en-US" dirty="0" smtClean="0">
-                <a:latin typeface="Courier"/>
-                <a:cs typeface="Courier"/>
-              </a:rPr>
-              <a:t> [options] &lt;prefix&gt; &lt;in1.sai&gt; &lt;in2.sai&gt; &lt;in1.fq&gt; &lt;in2.fq&gt;</a:t>
-            </a:r>
+              <a:t>Produces </a:t>
+            </a:r>
+            <a:r>
+              <a:rPr lang="en-US" dirty="0" smtClean="0"/>
+              <a:t>SAM output for paired-end </a:t>
+            </a:r>
+            <a:r>
+              <a:rPr lang="en-US" dirty="0" smtClean="0"/>
+              <a:t>reads</a:t>
+            </a:r>
+          </a:p>
+          <a:p>
+            <a:pPr lvl="1"/>
             <a:endParaRPr lang="en-US" dirty="0" smtClean="0"/>
-          </a:p>
-          <a:p>
-            <a:pPr lvl="1"/>
-            <a:r>
-              <a:rPr lang="en-US" dirty="0" err="1" smtClean="0"/>
-              <a:t>sai</a:t>
-            </a:r>
-            <a:r>
-              <a:rPr lang="en-US" dirty="0" smtClean="0"/>
-              <a:t> files produced by </a:t>
-            </a:r>
-            <a:r>
-              <a:rPr lang="en-US" dirty="0" err="1" smtClean="0"/>
-              <a:t>aln</a:t>
-            </a:r>
-            <a:r>
-              <a:rPr lang="en-US" dirty="0" smtClean="0"/>
-              <a:t> step</a:t>
-            </a:r>
-          </a:p>
-          <a:p>
-            <a:pPr lvl="1"/>
-            <a:r>
-              <a:rPr lang="en-US" dirty="0" smtClean="0"/>
-              <a:t>Produces SAM output for paired-end reads</a:t>
-            </a:r>
-          </a:p>
-          <a:p>
-            <a:r>
-              <a:rPr lang="en-US" dirty="0" err="1" smtClean="0">
-                <a:latin typeface="Courier"/>
-                <a:cs typeface="Courier"/>
-              </a:rPr>
-              <a:t>bwa</a:t>
-            </a:r>
-            <a:r>
-              <a:rPr lang="en-US" dirty="0" smtClean="0">
-                <a:latin typeface="Courier"/>
-                <a:cs typeface="Courier"/>
-              </a:rPr>
-              <a:t> </a:t>
-            </a:r>
-            <a:r>
-              <a:rPr lang="en-US" dirty="0" err="1" smtClean="0">
-                <a:latin typeface="Courier"/>
-                <a:cs typeface="Courier"/>
-              </a:rPr>
-              <a:t>samse</a:t>
-            </a:r>
-            <a:r>
-              <a:rPr lang="en-US" dirty="0" smtClean="0">
-                <a:latin typeface="Courier"/>
-                <a:cs typeface="Courier"/>
-              </a:rPr>
-              <a:t> </a:t>
-            </a:r>
-            <a:r>
-              <a:rPr lang="en-US" smtClean="0">
-                <a:latin typeface="Courier"/>
-                <a:cs typeface="Courier"/>
-              </a:rPr>
-              <a:t>[options] </a:t>
-            </a:r>
-            <a:r>
-              <a:rPr lang="en-US" dirty="0" smtClean="0">
-                <a:latin typeface="Courier"/>
-                <a:cs typeface="Courier"/>
-              </a:rPr>
-              <a:t>&lt;prefix&gt; &lt;</a:t>
-            </a:r>
-            <a:r>
-              <a:rPr lang="en-US" dirty="0" err="1" smtClean="0">
-                <a:latin typeface="Courier"/>
-                <a:cs typeface="Courier"/>
-              </a:rPr>
-              <a:t>in.sai</a:t>
-            </a:r>
-            <a:r>
-              <a:rPr lang="en-US" dirty="0" smtClean="0">
-                <a:latin typeface="Courier"/>
-                <a:cs typeface="Courier"/>
-              </a:rPr>
-              <a:t>&gt; &lt;</a:t>
-            </a:r>
-            <a:r>
-              <a:rPr lang="en-US" dirty="0" err="1" smtClean="0">
-                <a:latin typeface="Courier"/>
-                <a:cs typeface="Courier"/>
-              </a:rPr>
-              <a:t>in.fq</a:t>
-            </a:r>
-            <a:r>
-              <a:rPr lang="en-US" dirty="0" smtClean="0">
-                <a:latin typeface="Courier"/>
-                <a:cs typeface="Courier"/>
-              </a:rPr>
-              <a:t>&gt;</a:t>
-            </a:r>
-          </a:p>
-          <a:p>
-            <a:pPr lvl="1"/>
-            <a:r>
-              <a:rPr lang="en-US" dirty="0" smtClean="0"/>
-              <a:t>Unpaired reads – produces SAM output</a:t>
-            </a:r>
           </a:p>
           <a:p>
             <a:r>
@@ -9609,11 +9489,7 @@
           <a:p>
             <a:r>
               <a:rPr lang="en-US" dirty="0" smtClean="0"/>
-              <a:t>Local </a:t>
-            </a:r>
-            <a:r>
-              <a:rPr lang="en-US" dirty="0" smtClean="0"/>
-              <a:t>realignment</a:t>
+              <a:t>Local realignment</a:t>
             </a:r>
           </a:p>
           <a:p>
@@ -13156,14 +13032,14 @@
           </a:ln>
           <a:extLst>
             <a:ext uri="{909E8E84-426E-40dd-AFC4-6F175D3DCCD1}">
-              <a14:hiddenFill xmlns="" xmlns:a14="http://schemas.microsoft.com/office/drawing/2010/main">
+              <a14:hiddenFill xmlns:a14="http://schemas.microsoft.com/office/drawing/2010/main" xmlns="">
                 <a:solidFill>
                   <a:srgbClr val="FFFFFF"/>
                 </a:solidFill>
               </a14:hiddenFill>
             </a:ext>
             <a:ext uri="{91240B29-F687-4f45-9708-019B960494DF}">
-              <a14:hiddenLine xmlns="" xmlns:a14="http://schemas.microsoft.com/office/drawing/2010/main" w="9525">
+              <a14:hiddenLine xmlns:a14="http://schemas.microsoft.com/office/drawing/2010/main" xmlns="" w="9525">
                 <a:solidFill>
                   <a:srgbClr val="000000"/>
                 </a:solidFill>
@@ -13210,14 +13086,14 @@
           </a:ln>
           <a:extLst>
             <a:ext uri="{909E8E84-426E-40dd-AFC4-6F175D3DCCD1}">
-              <a14:hiddenFill xmlns="" xmlns:a14="http://schemas.microsoft.com/office/drawing/2010/main">
+              <a14:hiddenFill xmlns:a14="http://schemas.microsoft.com/office/drawing/2010/main" xmlns="">
                 <a:solidFill>
                   <a:srgbClr val="FFFFFF"/>
                 </a:solidFill>
               </a14:hiddenFill>
             </a:ext>
             <a:ext uri="{91240B29-F687-4f45-9708-019B960494DF}">
-              <a14:hiddenLine xmlns="" xmlns:a14="http://schemas.microsoft.com/office/drawing/2010/main" w="9525">
+              <a14:hiddenLine xmlns:a14="http://schemas.microsoft.com/office/drawing/2010/main" xmlns="" w="9525">
                 <a:solidFill>
                   <a:srgbClr val="000000"/>
                 </a:solidFill>
@@ -13264,14 +13140,14 @@
           </a:ln>
           <a:extLst>
             <a:ext uri="{909E8E84-426E-40dd-AFC4-6F175D3DCCD1}">
-              <a14:hiddenFill xmlns="" xmlns:a14="http://schemas.microsoft.com/office/drawing/2010/main">
+              <a14:hiddenFill xmlns:a14="http://schemas.microsoft.com/office/drawing/2010/main" xmlns="">
                 <a:solidFill>
                   <a:srgbClr val="FFFFFF"/>
                 </a:solidFill>
               </a14:hiddenFill>
             </a:ext>
             <a:ext uri="{91240B29-F687-4f45-9708-019B960494DF}">
-              <a14:hiddenLine xmlns="" xmlns:a14="http://schemas.microsoft.com/office/drawing/2010/main" w="9525">
+              <a14:hiddenLine xmlns:a14="http://schemas.microsoft.com/office/drawing/2010/main" xmlns="" w="9525">
                 <a:solidFill>
                   <a:srgbClr val="000000"/>
                 </a:solidFill>
@@ -13318,14 +13194,14 @@
           </a:ln>
           <a:extLst>
             <a:ext uri="{909E8E84-426E-40dd-AFC4-6F175D3DCCD1}">
-              <a14:hiddenFill xmlns="" xmlns:a14="http://schemas.microsoft.com/office/drawing/2010/main">
+              <a14:hiddenFill xmlns:a14="http://schemas.microsoft.com/office/drawing/2010/main" xmlns="">
                 <a:solidFill>
                   <a:srgbClr val="FFFFFF"/>
                 </a:solidFill>
               </a14:hiddenFill>
             </a:ext>
             <a:ext uri="{91240B29-F687-4f45-9708-019B960494DF}">
-              <a14:hiddenLine xmlns="" xmlns:a14="http://schemas.microsoft.com/office/drawing/2010/main" w="9525">
+              <a14:hiddenLine xmlns:a14="http://schemas.microsoft.com/office/drawing/2010/main" xmlns="" w="9525">
                 <a:solidFill>
                   <a:srgbClr val="000000"/>
                 </a:solidFill>
@@ -13378,14 +13254,14 @@
           </a:scene3d>
           <a:extLst>
             <a:ext uri="{909E8E84-426E-40dd-AFC4-6F175D3DCCD1}">
-              <a14:hiddenFill xmlns="" xmlns:a14="http://schemas.microsoft.com/office/drawing/2010/main">
+              <a14:hiddenFill xmlns:a14="http://schemas.microsoft.com/office/drawing/2010/main" xmlns="">
                 <a:solidFill>
                   <a:srgbClr val="FFFFFF"/>
                 </a:solidFill>
               </a14:hiddenFill>
             </a:ext>
             <a:ext uri="{91240B29-F687-4f45-9708-019B960494DF}">
-              <a14:hiddenLine xmlns="" xmlns:a14="http://schemas.microsoft.com/office/drawing/2010/main" w="9525">
+              <a14:hiddenLine xmlns:a14="http://schemas.microsoft.com/office/drawing/2010/main" xmlns="" w="9525">
                 <a:solidFill>
                   <a:srgbClr val="000000"/>
                 </a:solidFill>
@@ -16292,14 +16168,14 @@
           </a:ln>
           <a:extLst>
             <a:ext uri="{909E8E84-426E-40dd-AFC4-6F175D3DCCD1}">
-              <a14:hiddenFill xmlns="" xmlns:a14="http://schemas.microsoft.com/office/drawing/2010/main">
+              <a14:hiddenFill xmlns:a14="http://schemas.microsoft.com/office/drawing/2010/main" xmlns="">
                 <a:solidFill>
                   <a:srgbClr val="FFFFFF"/>
                 </a:solidFill>
               </a14:hiddenFill>
             </a:ext>
             <a:ext uri="{91240B29-F687-4f45-9708-019B960494DF}">
-              <a14:hiddenLine xmlns="" xmlns:a14="http://schemas.microsoft.com/office/drawing/2010/main" w="9525">
+              <a14:hiddenLine xmlns:a14="http://schemas.microsoft.com/office/drawing/2010/main" xmlns="" w="9525">
                 <a:solidFill>
                   <a:srgbClr val="000000"/>
                 </a:solidFill>
@@ -16346,14 +16222,14 @@
           </a:ln>
           <a:extLst>
             <a:ext uri="{909E8E84-426E-40dd-AFC4-6F175D3DCCD1}">
-              <a14:hiddenFill xmlns="" xmlns:a14="http://schemas.microsoft.com/office/drawing/2010/main">
+              <a14:hiddenFill xmlns:a14="http://schemas.microsoft.com/office/drawing/2010/main" xmlns="">
                 <a:solidFill>
                   <a:srgbClr val="FFFFFF"/>
                 </a:solidFill>
               </a14:hiddenFill>
             </a:ext>
             <a:ext uri="{91240B29-F687-4f45-9708-019B960494DF}">
-              <a14:hiddenLine xmlns="" xmlns:a14="http://schemas.microsoft.com/office/drawing/2010/main" w="9525">
+              <a14:hiddenLine xmlns:a14="http://schemas.microsoft.com/office/drawing/2010/main" xmlns="" w="9525">
                 <a:solidFill>
                   <a:srgbClr val="000000"/>
                 </a:solidFill>
@@ -16400,14 +16276,14 @@
           </a:ln>
           <a:extLst>
             <a:ext uri="{909E8E84-426E-40dd-AFC4-6F175D3DCCD1}">
-              <a14:hiddenFill xmlns="" xmlns:a14="http://schemas.microsoft.com/office/drawing/2010/main">
+              <a14:hiddenFill xmlns:a14="http://schemas.microsoft.com/office/drawing/2010/main" xmlns="">
                 <a:solidFill>
                   <a:srgbClr val="FFFFFF"/>
                 </a:solidFill>
               </a14:hiddenFill>
             </a:ext>
             <a:ext uri="{91240B29-F687-4f45-9708-019B960494DF}">
-              <a14:hiddenLine xmlns="" xmlns:a14="http://schemas.microsoft.com/office/drawing/2010/main" w="9525">
+              <a14:hiddenLine xmlns:a14="http://schemas.microsoft.com/office/drawing/2010/main" xmlns="" w="9525">
                 <a:solidFill>
                   <a:srgbClr val="000000"/>
                 </a:solidFill>
@@ -16454,14 +16330,14 @@
           </a:ln>
           <a:extLst>
             <a:ext uri="{909E8E84-426E-40dd-AFC4-6F175D3DCCD1}">
-              <a14:hiddenFill xmlns="" xmlns:a14="http://schemas.microsoft.com/office/drawing/2010/main">
+              <a14:hiddenFill xmlns:a14="http://schemas.microsoft.com/office/drawing/2010/main" xmlns="">
                 <a:solidFill>
                   <a:srgbClr val="FFFFFF"/>
                 </a:solidFill>
               </a14:hiddenFill>
             </a:ext>
             <a:ext uri="{91240B29-F687-4f45-9708-019B960494DF}">
-              <a14:hiddenLine xmlns="" xmlns:a14="http://schemas.microsoft.com/office/drawing/2010/main" w="9525">
+              <a14:hiddenLine xmlns:a14="http://schemas.microsoft.com/office/drawing/2010/main" xmlns="" w="9525">
                 <a:solidFill>
                   <a:srgbClr val="000000"/>
                 </a:solidFill>
@@ -16514,14 +16390,14 @@
           </a:scene3d>
           <a:extLst>
             <a:ext uri="{909E8E84-426E-40dd-AFC4-6F175D3DCCD1}">
-              <a14:hiddenFill xmlns="" xmlns:a14="http://schemas.microsoft.com/office/drawing/2010/main">
+              <a14:hiddenFill xmlns:a14="http://schemas.microsoft.com/office/drawing/2010/main" xmlns="">
                 <a:solidFill>
                   <a:srgbClr val="FFFFFF"/>
                 </a:solidFill>
               </a14:hiddenFill>
             </a:ext>
             <a:ext uri="{91240B29-F687-4f45-9708-019B960494DF}">
-              <a14:hiddenLine xmlns="" xmlns:a14="http://schemas.microsoft.com/office/drawing/2010/main" w="9525">
+              <a14:hiddenLine xmlns:a14="http://schemas.microsoft.com/office/drawing/2010/main" xmlns="" w="9525">
                 <a:solidFill>
                   <a:srgbClr val="000000"/>
                 </a:solidFill>
@@ -20650,14 +20526,14 @@
           </a:ln>
           <a:extLst>
             <a:ext uri="{909E8E84-426E-40dd-AFC4-6F175D3DCCD1}">
-              <a14:hiddenFill xmlns="" xmlns:a14="http://schemas.microsoft.com/office/drawing/2010/main">
+              <a14:hiddenFill xmlns:a14="http://schemas.microsoft.com/office/drawing/2010/main" xmlns="">
                 <a:solidFill>
                   <a:srgbClr val="FFFFFF"/>
                 </a:solidFill>
               </a14:hiddenFill>
             </a:ext>
             <a:ext uri="{91240B29-F687-4f45-9708-019B960494DF}">
-              <a14:hiddenLine xmlns="" xmlns:a14="http://schemas.microsoft.com/office/drawing/2010/main" w="9525">
+              <a14:hiddenLine xmlns:a14="http://schemas.microsoft.com/office/drawing/2010/main" xmlns="" w="9525">
                 <a:solidFill>
                   <a:srgbClr val="000000"/>
                 </a:solidFill>
@@ -20704,14 +20580,14 @@
           </a:ln>
           <a:extLst>
             <a:ext uri="{909E8E84-426E-40dd-AFC4-6F175D3DCCD1}">
-              <a14:hiddenFill xmlns="" xmlns:a14="http://schemas.microsoft.com/office/drawing/2010/main">
+              <a14:hiddenFill xmlns:a14="http://schemas.microsoft.com/office/drawing/2010/main" xmlns="">
                 <a:solidFill>
                   <a:srgbClr val="FFFFFF"/>
                 </a:solidFill>
               </a14:hiddenFill>
             </a:ext>
             <a:ext uri="{91240B29-F687-4f45-9708-019B960494DF}">
-              <a14:hiddenLine xmlns="" xmlns:a14="http://schemas.microsoft.com/office/drawing/2010/main" w="9525">
+              <a14:hiddenLine xmlns:a14="http://schemas.microsoft.com/office/drawing/2010/main" xmlns="" w="9525">
                 <a:solidFill>
                   <a:srgbClr val="000000"/>
                 </a:solidFill>
@@ -20758,14 +20634,14 @@
           </a:ln>
           <a:extLst>
             <a:ext uri="{909E8E84-426E-40dd-AFC4-6F175D3DCCD1}">
-              <a14:hiddenFill xmlns="" xmlns:a14="http://schemas.microsoft.com/office/drawing/2010/main">
+              <a14:hiddenFill xmlns:a14="http://schemas.microsoft.com/office/drawing/2010/main" xmlns="">
                 <a:solidFill>
                   <a:srgbClr val="FFFFFF"/>
                 </a:solidFill>
               </a14:hiddenFill>
             </a:ext>
             <a:ext uri="{91240B29-F687-4f45-9708-019B960494DF}">
-              <a14:hiddenLine xmlns="" xmlns:a14="http://schemas.microsoft.com/office/drawing/2010/main" w="9525">
+              <a14:hiddenLine xmlns:a14="http://schemas.microsoft.com/office/drawing/2010/main" xmlns="" w="9525">
                 <a:solidFill>
                   <a:srgbClr val="000000"/>
                 </a:solidFill>
@@ -20812,14 +20688,14 @@
           </a:ln>
           <a:extLst>
             <a:ext uri="{909E8E84-426E-40dd-AFC4-6F175D3DCCD1}">
-              <a14:hiddenFill xmlns="" xmlns:a14="http://schemas.microsoft.com/office/drawing/2010/main">
+              <a14:hiddenFill xmlns:a14="http://schemas.microsoft.com/office/drawing/2010/main" xmlns="">
                 <a:solidFill>
                   <a:srgbClr val="FFFFFF"/>
                 </a:solidFill>
               </a14:hiddenFill>
             </a:ext>
             <a:ext uri="{91240B29-F687-4f45-9708-019B960494DF}">
-              <a14:hiddenLine xmlns="" xmlns:a14="http://schemas.microsoft.com/office/drawing/2010/main" w="9525">
+              <a14:hiddenLine xmlns:a14="http://schemas.microsoft.com/office/drawing/2010/main" xmlns="" w="9525">
                 <a:solidFill>
                   <a:srgbClr val="000000"/>
                 </a:solidFill>
@@ -20872,14 +20748,14 @@
           </a:scene3d>
           <a:extLst>
             <a:ext uri="{909E8E84-426E-40dd-AFC4-6F175D3DCCD1}">
-              <a14:hiddenFill xmlns="" xmlns:a14="http://schemas.microsoft.com/office/drawing/2010/main">
+              <a14:hiddenFill xmlns:a14="http://schemas.microsoft.com/office/drawing/2010/main" xmlns="">
                 <a:solidFill>
                   <a:srgbClr val="FFFFFF"/>
                 </a:solidFill>
               </a14:hiddenFill>
             </a:ext>
             <a:ext uri="{91240B29-F687-4f45-9708-019B960494DF}">
-              <a14:hiddenLine xmlns="" xmlns:a14="http://schemas.microsoft.com/office/drawing/2010/main" w="9525">
+              <a14:hiddenLine xmlns:a14="http://schemas.microsoft.com/office/drawing/2010/main" xmlns="" w="9525">
                 <a:solidFill>
                   <a:srgbClr val="000000"/>
                 </a:solidFill>
@@ -21897,15 +21773,7 @@
             <a:pPr lvl="1"/>
             <a:r>
               <a:rPr lang="en-US" sz="1600" dirty="0" smtClean="0"/>
-              <a:t>Realignment (GATK</a:t>
-            </a:r>
-            <a:r>
-              <a:rPr lang="en-US" sz="1600" dirty="0" smtClean="0"/>
-              <a:t>):</a:t>
-            </a:r>
-            <a:r>
-              <a:rPr lang="en-US" sz="1600" dirty="0" smtClean="0"/>
-              <a:t/>
+              <a:t>Realignment (GATK):</a:t>
             </a:r>
             <a:br>
               <a:rPr lang="en-US" sz="1600" dirty="0" smtClean="0"/>
@@ -21939,11 +21807,7 @@
             <a:pPr lvl="1"/>
             <a:r>
               <a:rPr lang="en-US" sz="1600" dirty="0" smtClean="0"/>
-              <a:t>Library </a:t>
-            </a:r>
-            <a:r>
-              <a:rPr lang="en-US" sz="1600" dirty="0" smtClean="0"/>
-              <a:t>Merging</a:t>
+              <a:t>Library Merging</a:t>
             </a:r>
           </a:p>
           <a:p>

</xml_diff>